<commit_message>
Fixed respiratory compliance curve determination. Updated respiratory and anesthesia machine circuit diagrams. Updated some data flow diagrams. Tweaked some main page verbiage.
</commit_message>
<xml_diff>
--- a/docs/Figures/AnesthesiaMachineWorking.pptx
+++ b/docs/Figures/AnesthesiaMachineWorking.pptx
@@ -6,12 +6,13 @@
     <p:sldMasterId id="2147483672" r:id="rId2"/>
   </p:sldMasterIdLst>
   <p:notesMasterIdLst>
-    <p:notesMasterId r:id="rId6"/>
+    <p:notesMasterId r:id="rId7"/>
   </p:notesMasterIdLst>
   <p:sldIdLst>
     <p:sldId id="266" r:id="rId3"/>
     <p:sldId id="269" r:id="rId4"/>
     <p:sldId id="271" r:id="rId5"/>
+    <p:sldId id="272" r:id="rId6"/>
   </p:sldIdLst>
   <p:sldSz cx="9144000" cy="6858000" type="screen4x3"/>
   <p:notesSz cx="6996113" cy="9282113"/>
@@ -112,7 +113,7 @@
   </p:defaultTextStyle>
   <p:extLst>
     <p:ext uri="{EFAFB233-063F-42B5-8137-9DF3F51BA10A}">
-      <p15:sldGuideLst xmlns="" xmlns:p15="http://schemas.microsoft.com/office/powerpoint/2012/main">
+      <p15:sldGuideLst xmlns:p15="http://schemas.microsoft.com/office/powerpoint/2012/main">
         <p15:guide id="1" orient="horz" pos="2160">
           <p15:clr>
             <a:srgbClr val="A4A3A4"/>
@@ -211,7 +212,7 @@
           <a:p>
             <a:fld id="{7B126BB8-5932-4ACC-8CD5-328D9DA138C9}" type="datetimeFigureOut">
               <a:rPr lang="en-US" smtClean="0"/>
-              <a:t>12/2/2016</a:t>
+              <a:t>10/15/2019</a:t>
             </a:fld>
             <a:endParaRPr lang="en-US"/>
           </a:p>
@@ -275,38 +276,37 @@
           <a:p>
             <a:pPr lvl="0"/>
             <a:r>
-              <a:rPr lang="en-US" smtClean="0"/>
+              <a:rPr lang="en-US"/>
               <a:t>Click to edit Master text styles</a:t>
             </a:r>
           </a:p>
           <a:p>
             <a:pPr lvl="1"/>
             <a:r>
-              <a:rPr lang="en-US" smtClean="0"/>
+              <a:rPr lang="en-US"/>
               <a:t>Second level</a:t>
             </a:r>
           </a:p>
           <a:p>
             <a:pPr lvl="2"/>
             <a:r>
-              <a:rPr lang="en-US" smtClean="0"/>
+              <a:rPr lang="en-US"/>
               <a:t>Third level</a:t>
             </a:r>
           </a:p>
           <a:p>
             <a:pPr lvl="3"/>
             <a:r>
-              <a:rPr lang="en-US" smtClean="0"/>
+              <a:rPr lang="en-US"/>
               <a:t>Fourth level</a:t>
             </a:r>
           </a:p>
           <a:p>
             <a:pPr lvl="4"/>
             <a:r>
-              <a:rPr lang="en-US" smtClean="0"/>
+              <a:rPr lang="en-US"/>
               <a:t>Fifth level</a:t>
             </a:r>
-            <a:endParaRPr lang="en-US"/>
           </a:p>
         </p:txBody>
       </p:sp>
@@ -517,10 +517,9 @@
           <a:lstStyle/>
           <a:p>
             <a:r>
-              <a:rPr lang="en-US" smtClean="0"/>
+              <a:rPr lang="en-US"/>
               <a:t>Click to edit Master title style</a:t>
             </a:r>
-            <a:endParaRPr lang="en-US"/>
           </a:p>
         </p:txBody>
       </p:sp>
@@ -636,10 +635,9 @@
           </a:lstStyle>
           <a:p>
             <a:r>
-              <a:rPr lang="en-US" smtClean="0"/>
+              <a:rPr lang="en-US"/>
               <a:t>Click to edit Master subtitle style</a:t>
             </a:r>
-            <a:endParaRPr lang="en-US"/>
           </a:p>
         </p:txBody>
       </p:sp>
@@ -660,7 +658,7 @@
           <a:p>
             <a:fld id="{9E9AFD63-10BD-4598-9E1E-9FFECB76D2D7}" type="datetimeFigureOut">
               <a:rPr lang="en-US" smtClean="0"/>
-              <a:t>12/2/2016</a:t>
+              <a:t>10/15/2019</a:t>
             </a:fld>
             <a:endParaRPr lang="en-US"/>
           </a:p>
@@ -754,10 +752,9 @@
           <a:lstStyle/>
           <a:p>
             <a:r>
-              <a:rPr lang="en-US" smtClean="0"/>
+              <a:rPr lang="en-US"/>
               <a:t>Click to edit Master title style</a:t>
             </a:r>
-            <a:endParaRPr lang="en-US"/>
           </a:p>
         </p:txBody>
       </p:sp>
@@ -778,38 +775,37 @@
           <a:p>
             <a:pPr lvl="0"/>
             <a:r>
-              <a:rPr lang="en-US" smtClean="0"/>
+              <a:rPr lang="en-US"/>
               <a:t>Click to edit Master text styles</a:t>
             </a:r>
           </a:p>
           <a:p>
             <a:pPr lvl="1"/>
             <a:r>
-              <a:rPr lang="en-US" smtClean="0"/>
+              <a:rPr lang="en-US"/>
               <a:t>Second level</a:t>
             </a:r>
           </a:p>
           <a:p>
             <a:pPr lvl="2"/>
             <a:r>
-              <a:rPr lang="en-US" smtClean="0"/>
+              <a:rPr lang="en-US"/>
               <a:t>Third level</a:t>
             </a:r>
           </a:p>
           <a:p>
             <a:pPr lvl="3"/>
             <a:r>
-              <a:rPr lang="en-US" smtClean="0"/>
+              <a:rPr lang="en-US"/>
               <a:t>Fourth level</a:t>
             </a:r>
           </a:p>
           <a:p>
             <a:pPr lvl="4"/>
             <a:r>
-              <a:rPr lang="en-US" smtClean="0"/>
+              <a:rPr lang="en-US"/>
               <a:t>Fifth level</a:t>
             </a:r>
-            <a:endParaRPr lang="en-US"/>
           </a:p>
         </p:txBody>
       </p:sp>
@@ -830,7 +826,7 @@
           <a:p>
             <a:fld id="{9E9AFD63-10BD-4598-9E1E-9FFECB76D2D7}" type="datetimeFigureOut">
               <a:rPr lang="en-US" smtClean="0"/>
-              <a:t>12/2/2016</a:t>
+              <a:t>10/15/2019</a:t>
             </a:fld>
             <a:endParaRPr lang="en-US"/>
           </a:p>
@@ -929,10 +925,9 @@
           <a:lstStyle/>
           <a:p>
             <a:r>
-              <a:rPr lang="en-US" smtClean="0"/>
+              <a:rPr lang="en-US"/>
               <a:t>Click to edit Master title style</a:t>
             </a:r>
-            <a:endParaRPr lang="en-US"/>
           </a:p>
         </p:txBody>
       </p:sp>
@@ -958,38 +953,37 @@
           <a:p>
             <a:pPr lvl="0"/>
             <a:r>
-              <a:rPr lang="en-US" smtClean="0"/>
+              <a:rPr lang="en-US"/>
               <a:t>Click to edit Master text styles</a:t>
             </a:r>
           </a:p>
           <a:p>
             <a:pPr lvl="1"/>
             <a:r>
-              <a:rPr lang="en-US" smtClean="0"/>
+              <a:rPr lang="en-US"/>
               <a:t>Second level</a:t>
             </a:r>
           </a:p>
           <a:p>
             <a:pPr lvl="2"/>
             <a:r>
-              <a:rPr lang="en-US" smtClean="0"/>
+              <a:rPr lang="en-US"/>
               <a:t>Third level</a:t>
             </a:r>
           </a:p>
           <a:p>
             <a:pPr lvl="3"/>
             <a:r>
-              <a:rPr lang="en-US" smtClean="0"/>
+              <a:rPr lang="en-US"/>
               <a:t>Fourth level</a:t>
             </a:r>
           </a:p>
           <a:p>
             <a:pPr lvl="4"/>
             <a:r>
-              <a:rPr lang="en-US" smtClean="0"/>
+              <a:rPr lang="en-US"/>
               <a:t>Fifth level</a:t>
             </a:r>
-            <a:endParaRPr lang="en-US"/>
           </a:p>
         </p:txBody>
       </p:sp>
@@ -1010,7 +1004,7 @@
           <a:p>
             <a:fld id="{9E9AFD63-10BD-4598-9E1E-9FFECB76D2D7}" type="datetimeFigureOut">
               <a:rPr lang="en-US" smtClean="0"/>
-              <a:t>12/2/2016</a:t>
+              <a:t>10/15/2019</a:t>
             </a:fld>
             <a:endParaRPr lang="en-US"/>
           </a:p>
@@ -1205,10 +1199,9 @@
           </a:lstStyle>
           <a:p>
             <a:r>
-              <a:rPr lang="en-US" dirty="0" smtClean="0"/>
+              <a:rPr lang="en-US" dirty="0"/>
               <a:t>date</a:t>
             </a:r>
-            <a:endParaRPr lang="en-US" dirty="0"/>
           </a:p>
         </p:txBody>
       </p:sp>
@@ -1372,10 +1365,9 @@
           </a:lstStyle>
           <a:p>
             <a:r>
-              <a:rPr lang="en-US" dirty="0" smtClean="0"/>
+              <a:rPr lang="en-US" dirty="0"/>
               <a:t>Click to edit title</a:t>
             </a:r>
-            <a:endParaRPr lang="en-US" dirty="0"/>
           </a:p>
         </p:txBody>
       </p:sp>
@@ -1464,38 +1456,37 @@
           <a:p>
             <a:pPr lvl="0"/>
             <a:r>
-              <a:rPr lang="en-US" smtClean="0"/>
+              <a:rPr lang="en-US"/>
               <a:t>Click to edit Master text styles</a:t>
             </a:r>
           </a:p>
           <a:p>
             <a:pPr lvl="1"/>
             <a:r>
-              <a:rPr lang="en-US" smtClean="0"/>
+              <a:rPr lang="en-US"/>
               <a:t>Second level</a:t>
             </a:r>
           </a:p>
           <a:p>
             <a:pPr lvl="2"/>
             <a:r>
-              <a:rPr lang="en-US" smtClean="0"/>
+              <a:rPr lang="en-US"/>
               <a:t>Third level</a:t>
             </a:r>
           </a:p>
           <a:p>
             <a:pPr lvl="3"/>
             <a:r>
-              <a:rPr lang="en-US" smtClean="0"/>
+              <a:rPr lang="en-US"/>
               <a:t>Fourth level</a:t>
             </a:r>
           </a:p>
           <a:p>
             <a:pPr lvl="4"/>
             <a:r>
-              <a:rPr lang="en-US" smtClean="0"/>
+              <a:rPr lang="en-US"/>
               <a:t>Fifth level</a:t>
             </a:r>
-            <a:endParaRPr lang="en-US"/>
           </a:p>
         </p:txBody>
       </p:sp>
@@ -1525,7 +1516,7 @@
           <a:lstStyle/>
           <a:p>
             <a:r>
-              <a:rPr lang="en-US" smtClean="0"/>
+              <a:rPr lang="en-US"/>
               <a:t>Click to edit Master title style</a:t>
             </a:r>
             <a:endParaRPr lang="en-US" dirty="0"/>
@@ -1590,7 +1581,7 @@
           </a:lstStyle>
           <a:p>
             <a:r>
-              <a:rPr lang="en-US" smtClean="0"/>
+              <a:rPr lang="en-US"/>
               <a:t>Click to edit Master title style</a:t>
             </a:r>
             <a:endParaRPr lang="en-US" dirty="0"/>
@@ -1713,7 +1704,7 @@
           <a:p>
             <a:pPr lvl="0"/>
             <a:r>
-              <a:rPr lang="en-US" smtClean="0"/>
+              <a:rPr lang="en-US"/>
               <a:t>Click to edit Master text styles</a:t>
             </a:r>
           </a:p>
@@ -1802,35 +1793,35 @@
           <a:p>
             <a:pPr lvl="0"/>
             <a:r>
-              <a:rPr lang="en-US" smtClean="0"/>
+              <a:rPr lang="en-US"/>
               <a:t>Click to edit Master text styles</a:t>
             </a:r>
           </a:p>
           <a:p>
             <a:pPr lvl="1"/>
             <a:r>
-              <a:rPr lang="en-US" smtClean="0"/>
+              <a:rPr lang="en-US"/>
               <a:t>Second level</a:t>
             </a:r>
           </a:p>
           <a:p>
             <a:pPr lvl="2"/>
             <a:r>
-              <a:rPr lang="en-US" smtClean="0"/>
+              <a:rPr lang="en-US"/>
               <a:t>Third level</a:t>
             </a:r>
           </a:p>
           <a:p>
             <a:pPr lvl="3"/>
             <a:r>
-              <a:rPr lang="en-US" smtClean="0"/>
+              <a:rPr lang="en-US"/>
               <a:t>Fourth level</a:t>
             </a:r>
           </a:p>
           <a:p>
             <a:pPr lvl="4"/>
             <a:r>
-              <a:rPr lang="en-US" smtClean="0"/>
+              <a:rPr lang="en-US"/>
               <a:t>Fifth level</a:t>
             </a:r>
             <a:endParaRPr lang="en-US" dirty="0"/>
@@ -1890,38 +1881,37 @@
           <a:p>
             <a:pPr lvl="0"/>
             <a:r>
-              <a:rPr lang="en-US" smtClean="0"/>
+              <a:rPr lang="en-US"/>
               <a:t>Click to edit Master text styles</a:t>
             </a:r>
           </a:p>
           <a:p>
             <a:pPr lvl="1"/>
             <a:r>
-              <a:rPr lang="en-US" smtClean="0"/>
+              <a:rPr lang="en-US"/>
               <a:t>Second level</a:t>
             </a:r>
           </a:p>
           <a:p>
             <a:pPr lvl="2"/>
             <a:r>
-              <a:rPr lang="en-US" smtClean="0"/>
+              <a:rPr lang="en-US"/>
               <a:t>Third level</a:t>
             </a:r>
           </a:p>
           <a:p>
             <a:pPr lvl="3"/>
             <a:r>
-              <a:rPr lang="en-US" smtClean="0"/>
+              <a:rPr lang="en-US"/>
               <a:t>Fourth level</a:t>
             </a:r>
           </a:p>
           <a:p>
             <a:pPr lvl="4"/>
             <a:r>
-              <a:rPr lang="en-US" smtClean="0"/>
+              <a:rPr lang="en-US"/>
               <a:t>Fifth level</a:t>
             </a:r>
-            <a:endParaRPr lang="en-US"/>
           </a:p>
         </p:txBody>
       </p:sp>
@@ -1951,7 +1941,7 @@
           <a:lstStyle/>
           <a:p>
             <a:r>
-              <a:rPr lang="en-US" smtClean="0"/>
+              <a:rPr lang="en-US"/>
               <a:t>Click to edit Master title style</a:t>
             </a:r>
             <a:endParaRPr lang="en-US" dirty="0"/>
@@ -2052,7 +2042,7 @@
           <a:p>
             <a:pPr lvl="0"/>
             <a:r>
-              <a:rPr lang="en-US" smtClean="0"/>
+              <a:rPr lang="en-US"/>
               <a:t>Click to edit Master text styles</a:t>
             </a:r>
           </a:p>
@@ -2111,35 +2101,35 @@
           <a:p>
             <a:pPr lvl="0"/>
             <a:r>
-              <a:rPr lang="en-US" smtClean="0"/>
+              <a:rPr lang="en-US"/>
               <a:t>Click to edit Master text styles</a:t>
             </a:r>
           </a:p>
           <a:p>
             <a:pPr lvl="1"/>
             <a:r>
-              <a:rPr lang="en-US" smtClean="0"/>
+              <a:rPr lang="en-US"/>
               <a:t>Second level</a:t>
             </a:r>
           </a:p>
           <a:p>
             <a:pPr lvl="2"/>
             <a:r>
-              <a:rPr lang="en-US" smtClean="0"/>
+              <a:rPr lang="en-US"/>
               <a:t>Third level</a:t>
             </a:r>
           </a:p>
           <a:p>
             <a:pPr lvl="3"/>
             <a:r>
-              <a:rPr lang="en-US" smtClean="0"/>
+              <a:rPr lang="en-US"/>
               <a:t>Fourth level</a:t>
             </a:r>
           </a:p>
           <a:p>
             <a:pPr lvl="4"/>
             <a:r>
-              <a:rPr lang="en-US" smtClean="0"/>
+              <a:rPr lang="en-US"/>
               <a:t>Fifth level</a:t>
             </a:r>
             <a:endParaRPr lang="en-US" dirty="0"/>
@@ -2210,7 +2200,7 @@
           <a:p>
             <a:pPr lvl="0"/>
             <a:r>
-              <a:rPr lang="en-US" smtClean="0"/>
+              <a:rPr lang="en-US"/>
               <a:t>Click to edit Master text styles</a:t>
             </a:r>
           </a:p>
@@ -2269,38 +2259,37 @@
           <a:p>
             <a:pPr lvl="0"/>
             <a:r>
-              <a:rPr lang="en-US" smtClean="0"/>
+              <a:rPr lang="en-US"/>
               <a:t>Click to edit Master text styles</a:t>
             </a:r>
           </a:p>
           <a:p>
             <a:pPr lvl="1"/>
             <a:r>
-              <a:rPr lang="en-US" smtClean="0"/>
+              <a:rPr lang="en-US"/>
               <a:t>Second level</a:t>
             </a:r>
           </a:p>
           <a:p>
             <a:pPr lvl="2"/>
             <a:r>
-              <a:rPr lang="en-US" smtClean="0"/>
+              <a:rPr lang="en-US"/>
               <a:t>Third level</a:t>
             </a:r>
           </a:p>
           <a:p>
             <a:pPr lvl="3"/>
             <a:r>
-              <a:rPr lang="en-US" smtClean="0"/>
+              <a:rPr lang="en-US"/>
               <a:t>Fourth level</a:t>
             </a:r>
           </a:p>
           <a:p>
             <a:pPr lvl="4"/>
             <a:r>
-              <a:rPr lang="en-US" smtClean="0"/>
+              <a:rPr lang="en-US"/>
               <a:t>Fifth level</a:t>
             </a:r>
-            <a:endParaRPr lang="en-US"/>
           </a:p>
         </p:txBody>
       </p:sp>
@@ -2330,7 +2319,7 @@
           <a:lstStyle/>
           <a:p>
             <a:r>
-              <a:rPr lang="en-US" smtClean="0"/>
+              <a:rPr lang="en-US"/>
               <a:t>Click to edit Master title style</a:t>
             </a:r>
             <a:endParaRPr lang="en-US" dirty="0"/>
@@ -2393,7 +2382,7 @@
           <a:lstStyle/>
           <a:p>
             <a:r>
-              <a:rPr lang="en-US" smtClean="0"/>
+              <a:rPr lang="en-US"/>
               <a:t>Click to edit Master title style</a:t>
             </a:r>
             <a:endParaRPr lang="en-US" dirty="0"/>
@@ -2488,10 +2477,9 @@
           </a:lstStyle>
           <a:p>
             <a:r>
-              <a:rPr lang="en-US" smtClean="0"/>
+              <a:rPr lang="en-US"/>
               <a:t>Click to edit Master title style</a:t>
             </a:r>
-            <a:endParaRPr lang="en-US"/>
           </a:p>
         </p:txBody>
       </p:sp>
@@ -2548,35 +2536,35 @@
           <a:p>
             <a:pPr lvl="0"/>
             <a:r>
-              <a:rPr lang="en-US" smtClean="0"/>
+              <a:rPr lang="en-US"/>
               <a:t>Click to edit Master text styles</a:t>
             </a:r>
           </a:p>
           <a:p>
             <a:pPr lvl="1"/>
             <a:r>
-              <a:rPr lang="en-US" smtClean="0"/>
+              <a:rPr lang="en-US"/>
               <a:t>Second level</a:t>
             </a:r>
           </a:p>
           <a:p>
             <a:pPr lvl="2"/>
             <a:r>
-              <a:rPr lang="en-US" smtClean="0"/>
+              <a:rPr lang="en-US"/>
               <a:t>Third level</a:t>
             </a:r>
           </a:p>
           <a:p>
             <a:pPr lvl="3"/>
             <a:r>
-              <a:rPr lang="en-US" smtClean="0"/>
+              <a:rPr lang="en-US"/>
               <a:t>Fourth level</a:t>
             </a:r>
           </a:p>
           <a:p>
             <a:pPr lvl="4"/>
             <a:r>
-              <a:rPr lang="en-US" smtClean="0"/>
+              <a:rPr lang="en-US"/>
               <a:t>Fifth level</a:t>
             </a:r>
             <a:endParaRPr lang="en-US" dirty="0"/>
@@ -2645,7 +2633,7 @@
           <a:p>
             <a:pPr lvl="0"/>
             <a:r>
-              <a:rPr lang="en-US" smtClean="0"/>
+              <a:rPr lang="en-US"/>
               <a:t>Click to edit Master text styles</a:t>
             </a:r>
           </a:p>
@@ -2697,10 +2685,9 @@
           <a:lstStyle/>
           <a:p>
             <a:r>
-              <a:rPr lang="en-US" smtClean="0"/>
+              <a:rPr lang="en-US"/>
               <a:t>Click to edit Master title style</a:t>
             </a:r>
-            <a:endParaRPr lang="en-US"/>
           </a:p>
         </p:txBody>
       </p:sp>
@@ -2721,38 +2708,37 @@
           <a:p>
             <a:pPr lvl="0"/>
             <a:r>
-              <a:rPr lang="en-US" smtClean="0"/>
+              <a:rPr lang="en-US"/>
               <a:t>Click to edit Master text styles</a:t>
             </a:r>
           </a:p>
           <a:p>
             <a:pPr lvl="1"/>
             <a:r>
-              <a:rPr lang="en-US" smtClean="0"/>
+              <a:rPr lang="en-US"/>
               <a:t>Second level</a:t>
             </a:r>
           </a:p>
           <a:p>
             <a:pPr lvl="2"/>
             <a:r>
-              <a:rPr lang="en-US" smtClean="0"/>
+              <a:rPr lang="en-US"/>
               <a:t>Third level</a:t>
             </a:r>
           </a:p>
           <a:p>
             <a:pPr lvl="3"/>
             <a:r>
-              <a:rPr lang="en-US" smtClean="0"/>
+              <a:rPr lang="en-US"/>
               <a:t>Fourth level</a:t>
             </a:r>
           </a:p>
           <a:p>
             <a:pPr lvl="4"/>
             <a:r>
-              <a:rPr lang="en-US" smtClean="0"/>
+              <a:rPr lang="en-US"/>
               <a:t>Fifth level</a:t>
             </a:r>
-            <a:endParaRPr lang="en-US"/>
           </a:p>
         </p:txBody>
       </p:sp>
@@ -2773,7 +2759,7 @@
           <a:p>
             <a:fld id="{9E9AFD63-10BD-4598-9E1E-9FFECB76D2D7}" type="datetimeFigureOut">
               <a:rPr lang="en-US" smtClean="0"/>
-              <a:t>12/2/2016</a:t>
+              <a:t>10/15/2019</a:t>
             </a:fld>
             <a:endParaRPr lang="en-US"/>
           </a:p>
@@ -2879,10 +2865,9 @@
           </a:lstStyle>
           <a:p>
             <a:r>
-              <a:rPr lang="en-US" smtClean="0"/>
+              <a:rPr lang="en-US"/>
               <a:t>Click to edit Master title style</a:t>
             </a:r>
-            <a:endParaRPr lang="en-US"/>
           </a:p>
         </p:txBody>
       </p:sp>
@@ -2947,10 +2932,9 @@
           </a:lstStyle>
           <a:p>
             <a:r>
-              <a:rPr lang="en-US" smtClean="0"/>
+              <a:rPr lang="en-US"/>
               <a:t>Drag picture to placeholder or click icon to add</a:t>
             </a:r>
-            <a:endParaRPr lang="en-US"/>
           </a:p>
         </p:txBody>
       </p:sp>
@@ -3016,7 +3000,7 @@
           <a:p>
             <a:pPr lvl="0"/>
             <a:r>
-              <a:rPr lang="en-US" smtClean="0"/>
+              <a:rPr lang="en-US"/>
               <a:t>Click to edit Master text styles</a:t>
             </a:r>
           </a:p>
@@ -3077,10 +3061,9 @@
           </a:lstStyle>
           <a:p>
             <a:r>
-              <a:rPr lang="en-US" smtClean="0"/>
+              <a:rPr lang="en-US"/>
               <a:t>Click to edit Master title style</a:t>
             </a:r>
-            <a:endParaRPr lang="en-US"/>
           </a:p>
         </p:txBody>
       </p:sp>
@@ -3197,7 +3180,7 @@
           <a:p>
             <a:pPr lvl="0"/>
             <a:r>
-              <a:rPr lang="en-US" smtClean="0"/>
+              <a:rPr lang="en-US"/>
               <a:t>Click to edit Master text styles</a:t>
             </a:r>
           </a:p>
@@ -3220,7 +3203,7 @@
           <a:p>
             <a:fld id="{9E9AFD63-10BD-4598-9E1E-9FFECB76D2D7}" type="datetimeFigureOut">
               <a:rPr lang="en-US" smtClean="0"/>
-              <a:t>12/2/2016</a:t>
+              <a:t>10/15/2019</a:t>
             </a:fld>
             <a:endParaRPr lang="en-US"/>
           </a:p>
@@ -3314,10 +3297,9 @@
           <a:lstStyle/>
           <a:p>
             <a:r>
-              <a:rPr lang="en-US" smtClean="0"/>
+              <a:rPr lang="en-US"/>
               <a:t>Click to edit Master title style</a:t>
             </a:r>
-            <a:endParaRPr lang="en-US"/>
           </a:p>
         </p:txBody>
       </p:sp>
@@ -3371,38 +3353,37 @@
           <a:p>
             <a:pPr lvl="0"/>
             <a:r>
-              <a:rPr lang="en-US" smtClean="0"/>
+              <a:rPr lang="en-US"/>
               <a:t>Click to edit Master text styles</a:t>
             </a:r>
           </a:p>
           <a:p>
             <a:pPr lvl="1"/>
             <a:r>
-              <a:rPr lang="en-US" smtClean="0"/>
+              <a:rPr lang="en-US"/>
               <a:t>Second level</a:t>
             </a:r>
           </a:p>
           <a:p>
             <a:pPr lvl="2"/>
             <a:r>
-              <a:rPr lang="en-US" smtClean="0"/>
+              <a:rPr lang="en-US"/>
               <a:t>Third level</a:t>
             </a:r>
           </a:p>
           <a:p>
             <a:pPr lvl="3"/>
             <a:r>
-              <a:rPr lang="en-US" smtClean="0"/>
+              <a:rPr lang="en-US"/>
               <a:t>Fourth level</a:t>
             </a:r>
           </a:p>
           <a:p>
             <a:pPr lvl="4"/>
             <a:r>
-              <a:rPr lang="en-US" smtClean="0"/>
+              <a:rPr lang="en-US"/>
               <a:t>Fifth level</a:t>
             </a:r>
-            <a:endParaRPr lang="en-US"/>
           </a:p>
         </p:txBody>
       </p:sp>
@@ -3456,38 +3437,37 @@
           <a:p>
             <a:pPr lvl="0"/>
             <a:r>
-              <a:rPr lang="en-US" smtClean="0"/>
+              <a:rPr lang="en-US"/>
               <a:t>Click to edit Master text styles</a:t>
             </a:r>
           </a:p>
           <a:p>
             <a:pPr lvl="1"/>
             <a:r>
-              <a:rPr lang="en-US" smtClean="0"/>
+              <a:rPr lang="en-US"/>
               <a:t>Second level</a:t>
             </a:r>
           </a:p>
           <a:p>
             <a:pPr lvl="2"/>
             <a:r>
-              <a:rPr lang="en-US" smtClean="0"/>
+              <a:rPr lang="en-US"/>
               <a:t>Third level</a:t>
             </a:r>
           </a:p>
           <a:p>
             <a:pPr lvl="3"/>
             <a:r>
-              <a:rPr lang="en-US" smtClean="0"/>
+              <a:rPr lang="en-US"/>
               <a:t>Fourth level</a:t>
             </a:r>
           </a:p>
           <a:p>
             <a:pPr lvl="4"/>
             <a:r>
-              <a:rPr lang="en-US" smtClean="0"/>
+              <a:rPr lang="en-US"/>
               <a:t>Fifth level</a:t>
             </a:r>
-            <a:endParaRPr lang="en-US"/>
           </a:p>
         </p:txBody>
       </p:sp>
@@ -3508,7 +3488,7 @@
           <a:p>
             <a:fld id="{9E9AFD63-10BD-4598-9E1E-9FFECB76D2D7}" type="datetimeFigureOut">
               <a:rPr lang="en-US" smtClean="0"/>
-              <a:t>12/2/2016</a:t>
+              <a:t>10/15/2019</a:t>
             </a:fld>
             <a:endParaRPr lang="en-US"/>
           </a:p>
@@ -3606,10 +3586,9 @@
           </a:lstStyle>
           <a:p>
             <a:r>
-              <a:rPr lang="en-US" smtClean="0"/>
+              <a:rPr lang="en-US"/>
               <a:t>Click to edit Master title style</a:t>
             </a:r>
-            <a:endParaRPr lang="en-US"/>
           </a:p>
         </p:txBody>
       </p:sp>
@@ -3672,7 +3651,7 @@
           <a:p>
             <a:pPr lvl="0"/>
             <a:r>
-              <a:rPr lang="en-US" smtClean="0"/>
+              <a:rPr lang="en-US"/>
               <a:t>Click to edit Master text styles</a:t>
             </a:r>
           </a:p>
@@ -3728,38 +3707,37 @@
           <a:p>
             <a:pPr lvl="0"/>
             <a:r>
-              <a:rPr lang="en-US" smtClean="0"/>
+              <a:rPr lang="en-US"/>
               <a:t>Click to edit Master text styles</a:t>
             </a:r>
           </a:p>
           <a:p>
             <a:pPr lvl="1"/>
             <a:r>
-              <a:rPr lang="en-US" smtClean="0"/>
+              <a:rPr lang="en-US"/>
               <a:t>Second level</a:t>
             </a:r>
           </a:p>
           <a:p>
             <a:pPr lvl="2"/>
             <a:r>
-              <a:rPr lang="en-US" smtClean="0"/>
+              <a:rPr lang="en-US"/>
               <a:t>Third level</a:t>
             </a:r>
           </a:p>
           <a:p>
             <a:pPr lvl="3"/>
             <a:r>
-              <a:rPr lang="en-US" smtClean="0"/>
+              <a:rPr lang="en-US"/>
               <a:t>Fourth level</a:t>
             </a:r>
           </a:p>
           <a:p>
             <a:pPr lvl="4"/>
             <a:r>
-              <a:rPr lang="en-US" smtClean="0"/>
+              <a:rPr lang="en-US"/>
               <a:t>Fifth level</a:t>
             </a:r>
-            <a:endParaRPr lang="en-US"/>
           </a:p>
         </p:txBody>
       </p:sp>
@@ -3822,7 +3800,7 @@
           <a:p>
             <a:pPr lvl="0"/>
             <a:r>
-              <a:rPr lang="en-US" smtClean="0"/>
+              <a:rPr lang="en-US"/>
               <a:t>Click to edit Master text styles</a:t>
             </a:r>
           </a:p>
@@ -3878,38 +3856,37 @@
           <a:p>
             <a:pPr lvl="0"/>
             <a:r>
-              <a:rPr lang="en-US" smtClean="0"/>
+              <a:rPr lang="en-US"/>
               <a:t>Click to edit Master text styles</a:t>
             </a:r>
           </a:p>
           <a:p>
             <a:pPr lvl="1"/>
             <a:r>
-              <a:rPr lang="en-US" smtClean="0"/>
+              <a:rPr lang="en-US"/>
               <a:t>Second level</a:t>
             </a:r>
           </a:p>
           <a:p>
             <a:pPr lvl="2"/>
             <a:r>
-              <a:rPr lang="en-US" smtClean="0"/>
+              <a:rPr lang="en-US"/>
               <a:t>Third level</a:t>
             </a:r>
           </a:p>
           <a:p>
             <a:pPr lvl="3"/>
             <a:r>
-              <a:rPr lang="en-US" smtClean="0"/>
+              <a:rPr lang="en-US"/>
               <a:t>Fourth level</a:t>
             </a:r>
           </a:p>
           <a:p>
             <a:pPr lvl="4"/>
             <a:r>
-              <a:rPr lang="en-US" smtClean="0"/>
+              <a:rPr lang="en-US"/>
               <a:t>Fifth level</a:t>
             </a:r>
-            <a:endParaRPr lang="en-US"/>
           </a:p>
         </p:txBody>
       </p:sp>
@@ -3930,7 +3907,7 @@
           <a:p>
             <a:fld id="{9E9AFD63-10BD-4598-9E1E-9FFECB76D2D7}" type="datetimeFigureOut">
               <a:rPr lang="en-US" smtClean="0"/>
-              <a:t>12/2/2016</a:t>
+              <a:t>10/15/2019</a:t>
             </a:fld>
             <a:endParaRPr lang="en-US"/>
           </a:p>
@@ -4024,10 +4001,9 @@
           <a:lstStyle/>
           <a:p>
             <a:r>
-              <a:rPr lang="en-US" smtClean="0"/>
+              <a:rPr lang="en-US"/>
               <a:t>Click to edit Master title style</a:t>
             </a:r>
-            <a:endParaRPr lang="en-US"/>
           </a:p>
         </p:txBody>
       </p:sp>
@@ -4048,7 +4024,7 @@
           <a:p>
             <a:fld id="{9E9AFD63-10BD-4598-9E1E-9FFECB76D2D7}" type="datetimeFigureOut">
               <a:rPr lang="en-US" smtClean="0"/>
-              <a:t>12/2/2016</a:t>
+              <a:t>10/15/2019</a:t>
             </a:fld>
             <a:endParaRPr lang="en-US"/>
           </a:p>
@@ -4143,7 +4119,7 @@
           <a:p>
             <a:fld id="{9E9AFD63-10BD-4598-9E1E-9FFECB76D2D7}" type="datetimeFigureOut">
               <a:rPr lang="en-US" smtClean="0"/>
-              <a:t>12/2/2016</a:t>
+              <a:t>10/15/2019</a:t>
             </a:fld>
             <a:endParaRPr lang="en-US"/>
           </a:p>
@@ -4246,10 +4222,9 @@
           </a:lstStyle>
           <a:p>
             <a:r>
-              <a:rPr lang="en-US" smtClean="0"/>
+              <a:rPr lang="en-US"/>
               <a:t>Click to edit Master title style</a:t>
             </a:r>
-            <a:endParaRPr lang="en-US"/>
           </a:p>
         </p:txBody>
       </p:sp>
@@ -4303,38 +4278,37 @@
           <a:p>
             <a:pPr lvl="0"/>
             <a:r>
-              <a:rPr lang="en-US" smtClean="0"/>
+              <a:rPr lang="en-US"/>
               <a:t>Click to edit Master text styles</a:t>
             </a:r>
           </a:p>
           <a:p>
             <a:pPr lvl="1"/>
             <a:r>
-              <a:rPr lang="en-US" smtClean="0"/>
+              <a:rPr lang="en-US"/>
               <a:t>Second level</a:t>
             </a:r>
           </a:p>
           <a:p>
             <a:pPr lvl="2"/>
             <a:r>
-              <a:rPr lang="en-US" smtClean="0"/>
+              <a:rPr lang="en-US"/>
               <a:t>Third level</a:t>
             </a:r>
           </a:p>
           <a:p>
             <a:pPr lvl="3"/>
             <a:r>
-              <a:rPr lang="en-US" smtClean="0"/>
+              <a:rPr lang="en-US"/>
               <a:t>Fourth level</a:t>
             </a:r>
           </a:p>
           <a:p>
             <a:pPr lvl="4"/>
             <a:r>
-              <a:rPr lang="en-US" smtClean="0"/>
+              <a:rPr lang="en-US"/>
               <a:t>Fifth level</a:t>
             </a:r>
-            <a:endParaRPr lang="en-US"/>
           </a:p>
         </p:txBody>
       </p:sp>
@@ -4397,7 +4371,7 @@
           <a:p>
             <a:pPr lvl="0"/>
             <a:r>
-              <a:rPr lang="en-US" smtClean="0"/>
+              <a:rPr lang="en-US"/>
               <a:t>Click to edit Master text styles</a:t>
             </a:r>
           </a:p>
@@ -4420,7 +4394,7 @@
           <a:p>
             <a:fld id="{9E9AFD63-10BD-4598-9E1E-9FFECB76D2D7}" type="datetimeFigureOut">
               <a:rPr lang="en-US" smtClean="0"/>
-              <a:t>12/2/2016</a:t>
+              <a:t>10/15/2019</a:t>
             </a:fld>
             <a:endParaRPr lang="en-US"/>
           </a:p>
@@ -4523,10 +4497,9 @@
           </a:lstStyle>
           <a:p>
             <a:r>
-              <a:rPr lang="en-US" smtClean="0"/>
+              <a:rPr lang="en-US"/>
               <a:t>Click to edit Master title style</a:t>
             </a:r>
-            <a:endParaRPr lang="en-US"/>
           </a:p>
         </p:txBody>
       </p:sp>
@@ -4650,7 +4623,7 @@
           <a:p>
             <a:pPr lvl="0"/>
             <a:r>
-              <a:rPr lang="en-US" smtClean="0"/>
+              <a:rPr lang="en-US"/>
               <a:t>Click to edit Master text styles</a:t>
             </a:r>
           </a:p>
@@ -4673,7 +4646,7 @@
           <a:p>
             <a:fld id="{9E9AFD63-10BD-4598-9E1E-9FFECB76D2D7}" type="datetimeFigureOut">
               <a:rPr lang="en-US" smtClean="0"/>
-              <a:t>12/2/2016</a:t>
+              <a:t>10/15/2019</a:t>
             </a:fld>
             <a:endParaRPr lang="en-US"/>
           </a:p>
@@ -4782,10 +4755,9 @@
           <a:lstStyle/>
           <a:p>
             <a:r>
-              <a:rPr lang="en-US" smtClean="0"/>
+              <a:rPr lang="en-US"/>
               <a:t>Click to edit Master title style</a:t>
             </a:r>
-            <a:endParaRPr lang="en-US"/>
           </a:p>
         </p:txBody>
       </p:sp>
@@ -4816,38 +4788,37 @@
           <a:p>
             <a:pPr lvl="0"/>
             <a:r>
-              <a:rPr lang="en-US" smtClean="0"/>
+              <a:rPr lang="en-US"/>
               <a:t>Click to edit Master text styles</a:t>
             </a:r>
           </a:p>
           <a:p>
             <a:pPr lvl="1"/>
             <a:r>
-              <a:rPr lang="en-US" smtClean="0"/>
+              <a:rPr lang="en-US"/>
               <a:t>Second level</a:t>
             </a:r>
           </a:p>
           <a:p>
             <a:pPr lvl="2"/>
             <a:r>
-              <a:rPr lang="en-US" smtClean="0"/>
+              <a:rPr lang="en-US"/>
               <a:t>Third level</a:t>
             </a:r>
           </a:p>
           <a:p>
             <a:pPr lvl="3"/>
             <a:r>
-              <a:rPr lang="en-US" smtClean="0"/>
+              <a:rPr lang="en-US"/>
               <a:t>Fourth level</a:t>
             </a:r>
           </a:p>
           <a:p>
             <a:pPr lvl="4"/>
             <a:r>
-              <a:rPr lang="en-US" smtClean="0"/>
+              <a:rPr lang="en-US"/>
               <a:t>Fifth level</a:t>
             </a:r>
-            <a:endParaRPr lang="en-US"/>
           </a:p>
         </p:txBody>
       </p:sp>
@@ -4886,7 +4857,7 @@
           <a:p>
             <a:fld id="{9E9AFD63-10BD-4598-9E1E-9FFECB76D2D7}" type="datetimeFigureOut">
               <a:rPr lang="en-US" smtClean="0"/>
-              <a:t>12/2/2016</a:t>
+              <a:t>10/15/2019</a:t>
             </a:fld>
             <a:endParaRPr lang="en-US"/>
           </a:p>
@@ -5382,10 +5353,10 @@
                 <a:ea typeface="ＭＳ Ｐゴシック" pitchFamily="-106" charset="-128"/>
                 <a:cs typeface="ＭＳ Ｐゴシック" pitchFamily="-106" charset="-128"/>
               </a:rPr>
-              <a:t>Copyright </a:t>
-            </a:r>
-            <a:r>
-              <a:rPr lang="en-US" sz="600" dirty="0" smtClean="0">
+              <a:t>Copyright 2014. All rights reserved. Applied </a:t>
+            </a:r>
+            <a:r>
+              <a:rPr lang="en-US" sz="600" dirty="0" err="1">
                 <a:solidFill>
                   <a:prstClr val="black">
                     <a:lumMod val="65000"/>
@@ -5397,7 +5368,7 @@
                 <a:ea typeface="ＭＳ Ｐゴシック" pitchFamily="-106" charset="-128"/>
                 <a:cs typeface="ＭＳ Ｐゴシック" pitchFamily="-106" charset="-128"/>
               </a:rPr>
-              <a:t>2014. </a:t>
+              <a:t>ReArch</a:t>
             </a:r>
             <a:r>
               <a:rPr lang="en-US" sz="600" dirty="0">
@@ -5412,52 +5383,7 @@
                 <a:ea typeface="ＭＳ Ｐゴシック" pitchFamily="-106" charset="-128"/>
                 <a:cs typeface="ＭＳ Ｐゴシック" pitchFamily="-106" charset="-128"/>
               </a:rPr>
-              <a:t>All rights reserved. Applied </a:t>
-            </a:r>
-            <a:r>
-              <a:rPr lang="en-US" sz="600" dirty="0" err="1" smtClean="0">
-                <a:solidFill>
-                  <a:prstClr val="black">
-                    <a:lumMod val="65000"/>
-                    <a:lumOff val="35000"/>
-                    <a:alpha val="30000"/>
-                  </a:prstClr>
-                </a:solidFill>
-                <a:latin typeface="Arial" pitchFamily="-108" charset="0"/>
-                <a:ea typeface="ＭＳ Ｐゴシック" pitchFamily="-106" charset="-128"/>
-                <a:cs typeface="ＭＳ Ｐゴシック" pitchFamily="-106" charset="-128"/>
-              </a:rPr>
-              <a:t>ReArch</a:t>
-            </a:r>
-            <a:r>
-              <a:rPr lang="en-US" sz="600" dirty="0" smtClean="0">
-                <a:solidFill>
-                  <a:prstClr val="black">
-                    <a:lumMod val="65000"/>
-                    <a:lumOff val="35000"/>
-                    <a:alpha val="30000"/>
-                  </a:prstClr>
-                </a:solidFill>
-                <a:latin typeface="Arial" pitchFamily="-108" charset="0"/>
-                <a:ea typeface="ＭＳ Ｐゴシック" pitchFamily="-106" charset="-128"/>
-                <a:cs typeface="ＭＳ Ｐゴシック" pitchFamily="-106" charset="-128"/>
-              </a:rPr>
-              <a:t> </a:t>
-            </a:r>
-            <a:r>
-              <a:rPr lang="en-US" sz="600" dirty="0">
-                <a:solidFill>
-                  <a:prstClr val="black">
-                    <a:lumMod val="65000"/>
-                    <a:lumOff val="35000"/>
-                    <a:alpha val="30000"/>
-                  </a:prstClr>
-                </a:solidFill>
-                <a:latin typeface="Arial" pitchFamily="-108" charset="0"/>
-                <a:ea typeface="ＭＳ Ｐゴシック" pitchFamily="-106" charset="-128"/>
-                <a:cs typeface="ＭＳ Ｐゴシック" pitchFamily="-106" charset="-128"/>
-              </a:rPr>
-              <a:t>Associates, Inc.</a:t>
+              <a:t> Associates, Inc.</a:t>
             </a:r>
           </a:p>
         </p:txBody>
@@ -5540,35 +5466,35 @@
           <a:p>
             <a:pPr lvl="0"/>
             <a:r>
-              <a:rPr lang="en-US" smtClean="0"/>
+              <a:rPr lang="en-US"/>
               <a:t>Click to edit Master text styles</a:t>
             </a:r>
           </a:p>
           <a:p>
             <a:pPr lvl="1"/>
             <a:r>
-              <a:rPr lang="en-US" smtClean="0"/>
+              <a:rPr lang="en-US"/>
               <a:t>Second level</a:t>
             </a:r>
           </a:p>
           <a:p>
             <a:pPr lvl="2"/>
             <a:r>
-              <a:rPr lang="en-US" smtClean="0"/>
+              <a:rPr lang="en-US"/>
               <a:t>Third level</a:t>
             </a:r>
           </a:p>
           <a:p>
             <a:pPr lvl="3"/>
             <a:r>
-              <a:rPr lang="en-US" smtClean="0"/>
+              <a:rPr lang="en-US"/>
               <a:t>Fourth level</a:t>
             </a:r>
           </a:p>
           <a:p>
             <a:pPr lvl="4"/>
             <a:r>
-              <a:rPr lang="en-US" smtClean="0"/>
+              <a:rPr lang="en-US"/>
               <a:t>Fifth level</a:t>
             </a:r>
             <a:endParaRPr lang="en-US" dirty="0"/>
@@ -5601,7 +5527,7 @@
           <a:lstStyle/>
           <a:p>
             <a:r>
-              <a:rPr lang="en-US" smtClean="0"/>
+              <a:rPr lang="en-US"/>
               <a:t>Click to edit Master title style</a:t>
             </a:r>
             <a:endParaRPr lang="en-US" dirty="0"/>
@@ -6170,7 +6096,7 @@
           <a:p>
             <a:pPr algn="ctr"/>
             <a:r>
-              <a:rPr lang="en-US" sz="1050" b="1" u="sng" dirty="0" smtClean="0">
+              <a:rPr lang="en-US" sz="1050" b="1" u="sng" dirty="0">
                 <a:solidFill>
                   <a:prstClr val="white"/>
                 </a:solidFill>
@@ -6184,7 +6110,7 @@
               <a:buChar char="•"/>
             </a:pPr>
             <a:r>
-              <a:rPr lang="en-US" sz="1050" dirty="0" err="1" smtClean="0"/>
+              <a:rPr lang="en-US" sz="1050" dirty="0" err="1"/>
               <a:t>CalculateCyclePhase</a:t>
             </a:r>
             <a:endParaRPr lang="en-US" sz="1050" dirty="0"/>
@@ -6195,7 +6121,7 @@
               <a:buChar char="•"/>
             </a:pPr>
             <a:r>
-              <a:rPr lang="en-US" sz="1050" dirty="0" err="1" smtClean="0"/>
+              <a:rPr lang="en-US" sz="1050" dirty="0" err="1"/>
               <a:t>CalculateSourceStatus</a:t>
             </a:r>
             <a:endParaRPr lang="en-US" sz="1050" dirty="0"/>
@@ -6206,7 +6132,7 @@
               <a:buChar char="•"/>
             </a:pPr>
             <a:r>
-              <a:rPr lang="en-US" sz="1050" dirty="0" err="1" smtClean="0"/>
+              <a:rPr lang="en-US" sz="1050" dirty="0" err="1"/>
               <a:t>SetConnection</a:t>
             </a:r>
             <a:endParaRPr lang="en-US" sz="1050" dirty="0"/>
@@ -6217,7 +6143,7 @@
               <a:buChar char="•"/>
             </a:pPr>
             <a:r>
-              <a:rPr lang="en-US" sz="1050" dirty="0" err="1" smtClean="0"/>
+              <a:rPr lang="en-US" sz="1050" dirty="0" err="1"/>
               <a:t>CalculateValveResistances</a:t>
             </a:r>
             <a:endParaRPr lang="en-US" sz="1050" dirty="0"/>
@@ -6228,7 +6154,7 @@
               <a:buChar char="•"/>
             </a:pPr>
             <a:r>
-              <a:rPr lang="en-US" sz="1050" dirty="0" err="1" smtClean="0"/>
+              <a:rPr lang="en-US" sz="1050" dirty="0" err="1"/>
               <a:t>CalculateEquipmentLeak</a:t>
             </a:r>
             <a:endParaRPr lang="en-US" sz="1050" dirty="0"/>
@@ -6239,7 +6165,7 @@
               <a:buChar char="•"/>
             </a:pPr>
             <a:r>
-              <a:rPr lang="en-US" sz="1050" dirty="0" err="1" smtClean="0"/>
+              <a:rPr lang="en-US" sz="1050" dirty="0" err="1"/>
               <a:t>CalculateVentilator</a:t>
             </a:r>
             <a:endParaRPr lang="en-US" sz="1050" dirty="0"/>
@@ -6250,7 +6176,7 @@
               <a:buChar char="•"/>
             </a:pPr>
             <a:r>
-              <a:rPr lang="en-US" sz="1050" dirty="0" err="1" smtClean="0"/>
+              <a:rPr lang="en-US" sz="1050" dirty="0" err="1"/>
               <a:t>CalculateGasSource</a:t>
             </a:r>
             <a:endParaRPr lang="en-US" sz="1050" dirty="0"/>
@@ -6261,7 +6187,7 @@
               <a:buChar char="•"/>
             </a:pPr>
             <a:r>
-              <a:rPr lang="en-US" sz="1050" dirty="0" err="1" smtClean="0"/>
+              <a:rPr lang="en-US" sz="1050" dirty="0" err="1"/>
               <a:t>CheckReliefValve</a:t>
             </a:r>
             <a:endParaRPr lang="en-US" sz="1050" dirty="0"/>
@@ -6305,7 +6231,7 @@
           <a:p>
             <a:pPr algn="ctr"/>
             <a:r>
-              <a:rPr lang="en-US" sz="1050" b="1" u="sng" dirty="0" smtClean="0">
+              <a:rPr lang="en-US" sz="1050" b="1" u="sng" dirty="0">
                 <a:solidFill>
                   <a:prstClr val="white"/>
                 </a:solidFill>
@@ -6319,7 +6245,7 @@
               <a:buChar char="•"/>
             </a:pPr>
             <a:r>
-              <a:rPr lang="en-US" sz="1050" i="1" dirty="0" smtClean="0"/>
+              <a:rPr lang="en-US" sz="1050" i="1" dirty="0"/>
               <a:t>Combined Circuit Solved by Respiratory</a:t>
             </a:r>
           </a:p>
@@ -6329,7 +6255,7 @@
               <a:buChar char="•"/>
             </a:pPr>
             <a:r>
-              <a:rPr lang="en-US" sz="1050" dirty="0" err="1" smtClean="0"/>
+              <a:rPr lang="en-US" sz="1050" dirty="0" err="1"/>
               <a:t>CalculateScrubber</a:t>
             </a:r>
             <a:endParaRPr lang="en-US" sz="1050" dirty="0">
@@ -6377,14 +6303,14 @@
           <a:p>
             <a:pPr algn="ctr"/>
             <a:r>
-              <a:rPr lang="en-US" sz="1050" b="1" u="sng" dirty="0" err="1" smtClean="0">
+              <a:rPr lang="en-US" sz="1050" b="1" u="sng" dirty="0" err="1">
                 <a:solidFill>
                   <a:prstClr val="white"/>
                 </a:solidFill>
               </a:rPr>
               <a:t>PostProcess</a:t>
             </a:r>
-            <a:endParaRPr lang="en-US" sz="1050" b="1" u="sng" dirty="0" smtClean="0">
+            <a:endParaRPr lang="en-US" sz="1050" b="1" u="sng" dirty="0">
               <a:solidFill>
                 <a:prstClr val="white"/>
               </a:solidFill>
@@ -6396,7 +6322,7 @@
               <a:buChar char="•"/>
             </a:pPr>
             <a:r>
-              <a:rPr lang="en-US" sz="1050" i="1" dirty="0" smtClean="0"/>
+              <a:rPr lang="en-US" sz="1050" i="1" dirty="0"/>
               <a:t>Combined Circuit Time Advanced by Respiratory</a:t>
             </a:r>
           </a:p>
@@ -6500,13 +6426,6 @@
   <p:clrMapOvr>
     <a:masterClrMapping/>
   </p:clrMapOvr>
-  <p:timing>
-    <p:tnLst>
-      <p:par>
-        <p:cTn id="1" dur="indefinite" restart="never" nodeType="tmRoot"/>
-      </p:par>
-    </p:tnLst>
-  </p:timing>
 </p:sld>
 </file>
 
@@ -7516,7 +7435,7 @@
           <a:lstStyle/>
           <a:p>
             <a:r>
-              <a:rPr lang="en-US" dirty="0" smtClean="0">
+              <a:rPr lang="en-US" dirty="0">
                 <a:solidFill>
                   <a:prstClr val="black"/>
                 </a:solidFill>
@@ -7526,18 +7445,13 @@
           </a:p>
           <a:p>
             <a:r>
-              <a:rPr lang="en-US" dirty="0" smtClean="0">
+              <a:rPr lang="en-US" dirty="0">
                 <a:solidFill>
                   <a:prstClr val="black"/>
                 </a:solidFill>
               </a:rPr>
               <a:t>Limb</a:t>
             </a:r>
-            <a:endParaRPr lang="en-US" dirty="0">
-              <a:solidFill>
-                <a:prstClr val="black"/>
-              </a:solidFill>
-            </a:endParaRPr>
           </a:p>
         </p:txBody>
       </p:sp>
@@ -7620,7 +7534,7 @@
           <a:lstStyle/>
           <a:p>
             <a:r>
-              <a:rPr lang="en-US" dirty="0" smtClean="0">
+              <a:rPr lang="en-US" dirty="0">
                 <a:solidFill>
                   <a:prstClr val="black"/>
                 </a:solidFill>
@@ -7630,18 +7544,13 @@
           </a:p>
           <a:p>
             <a:r>
-              <a:rPr lang="en-US" dirty="0" smtClean="0">
+              <a:rPr lang="en-US" dirty="0">
                 <a:solidFill>
                   <a:prstClr val="black"/>
                 </a:solidFill>
               </a:rPr>
               <a:t>Inlet</a:t>
             </a:r>
-            <a:endParaRPr lang="en-US" dirty="0">
-              <a:solidFill>
-                <a:prstClr val="black"/>
-              </a:solidFill>
-            </a:endParaRPr>
           </a:p>
         </p:txBody>
       </p:sp>
@@ -7668,7 +7577,7 @@
           <a:lstStyle/>
           <a:p>
             <a:r>
-              <a:rPr lang="en-US" dirty="0" smtClean="0">
+              <a:rPr lang="en-US" dirty="0">
                 <a:solidFill>
                   <a:prstClr val="black"/>
                 </a:solidFill>
@@ -7678,18 +7587,13 @@
           </a:p>
           <a:p>
             <a:r>
-              <a:rPr lang="en-US" dirty="0" smtClean="0">
+              <a:rPr lang="en-US" dirty="0">
                 <a:solidFill>
                   <a:prstClr val="black"/>
                 </a:solidFill>
               </a:rPr>
               <a:t>Limb</a:t>
             </a:r>
-            <a:endParaRPr lang="en-US" dirty="0">
-              <a:solidFill>
-                <a:prstClr val="black"/>
-              </a:solidFill>
-            </a:endParaRPr>
           </a:p>
         </p:txBody>
       </p:sp>
@@ -7751,18 +7655,13 @@
           <a:lstStyle/>
           <a:p>
             <a:r>
-              <a:rPr lang="en-US" dirty="0" smtClean="0">
+              <a:rPr lang="en-US" dirty="0">
                 <a:solidFill>
                   <a:prstClr val="black"/>
                 </a:solidFill>
               </a:rPr>
               <a:t>Y-Piece</a:t>
             </a:r>
-            <a:endParaRPr lang="en-US" dirty="0">
-              <a:solidFill>
-                <a:prstClr val="black"/>
-              </a:solidFill>
-            </a:endParaRPr>
           </a:p>
         </p:txBody>
       </p:sp>
@@ -7789,18 +7688,13 @@
           <a:lstStyle/>
           <a:p>
             <a:r>
-              <a:rPr lang="en-US" dirty="0" smtClean="0">
+              <a:rPr lang="en-US" dirty="0">
                 <a:solidFill>
                   <a:prstClr val="black"/>
                 </a:solidFill>
               </a:rPr>
               <a:t>Scrubber</a:t>
             </a:r>
-            <a:endParaRPr lang="en-US" dirty="0">
-              <a:solidFill>
-                <a:prstClr val="black"/>
-              </a:solidFill>
-            </a:endParaRPr>
           </a:p>
         </p:txBody>
       </p:sp>
@@ -7987,7 +7881,7 @@
           <a:lstStyle/>
           <a:p>
             <a:r>
-              <a:rPr lang="en-US" dirty="0" smtClean="0">
+              <a:rPr lang="en-US" dirty="0">
                 <a:solidFill>
                   <a:prstClr val="black"/>
                 </a:solidFill>
@@ -7997,18 +7891,13 @@
           </a:p>
           <a:p>
             <a:r>
-              <a:rPr lang="en-US" dirty="0" smtClean="0">
+              <a:rPr lang="en-US" dirty="0">
                 <a:solidFill>
                   <a:prstClr val="black"/>
                 </a:solidFill>
               </a:rPr>
               <a:t>Valve</a:t>
             </a:r>
-            <a:endParaRPr lang="en-US" dirty="0">
-              <a:solidFill>
-                <a:prstClr val="black"/>
-              </a:solidFill>
-            </a:endParaRPr>
           </a:p>
         </p:txBody>
       </p:sp>
@@ -8329,18 +8218,13 @@
           <a:lstStyle/>
           <a:p>
             <a:r>
-              <a:rPr lang="en-US" dirty="0" smtClean="0">
+              <a:rPr lang="en-US" dirty="0">
                 <a:solidFill>
                   <a:prstClr val="black"/>
                 </a:solidFill>
               </a:rPr>
               <a:t>Selector</a:t>
             </a:r>
-            <a:endParaRPr lang="en-US" dirty="0">
-              <a:solidFill>
-                <a:prstClr val="black"/>
-              </a:solidFill>
-            </a:endParaRPr>
           </a:p>
         </p:txBody>
       </p:sp>
@@ -8402,18 +8286,13 @@
           <a:lstStyle/>
           <a:p>
             <a:r>
-              <a:rPr lang="en-US" dirty="0" smtClean="0">
+              <a:rPr lang="en-US" dirty="0">
                 <a:solidFill>
                   <a:prstClr val="black"/>
                 </a:solidFill>
               </a:rPr>
               <a:t>Connection</a:t>
             </a:r>
-            <a:endParaRPr lang="en-US" dirty="0">
-              <a:solidFill>
-                <a:prstClr val="black"/>
-              </a:solidFill>
-            </a:endParaRPr>
           </a:p>
         </p:txBody>
       </p:sp>
@@ -8529,7 +8408,7 @@
           <a:lstStyle/>
           <a:p>
             <a:r>
-              <a:rPr lang="en-US" dirty="0" smtClean="0">
+              <a:rPr lang="en-US" dirty="0">
                 <a:solidFill>
                   <a:prstClr val="black"/>
                 </a:solidFill>
@@ -8539,18 +8418,13 @@
           </a:p>
           <a:p>
             <a:r>
-              <a:rPr lang="en-US" dirty="0" smtClean="0">
+              <a:rPr lang="en-US" dirty="0">
                 <a:solidFill>
                   <a:prstClr val="black"/>
                 </a:solidFill>
               </a:rPr>
               <a:t>Source</a:t>
             </a:r>
-            <a:endParaRPr lang="en-US" dirty="0">
-              <a:solidFill>
-                <a:prstClr val="black"/>
-              </a:solidFill>
-            </a:endParaRPr>
           </a:p>
         </p:txBody>
       </p:sp>
@@ -8612,7 +8486,7 @@
           <a:lstStyle/>
           <a:p>
             <a:r>
-              <a:rPr lang="en-US" dirty="0" smtClean="0">
+              <a:rPr lang="en-US" dirty="0">
                 <a:solidFill>
                   <a:prstClr val="black"/>
                 </a:solidFill>
@@ -8622,18 +8496,13 @@
           </a:p>
           <a:p>
             <a:r>
-              <a:rPr lang="en-US" dirty="0" smtClean="0">
+              <a:rPr lang="en-US" dirty="0">
                 <a:solidFill>
                   <a:prstClr val="black"/>
                 </a:solidFill>
               </a:rPr>
               <a:t>Check Valve</a:t>
             </a:r>
-            <a:endParaRPr lang="en-US" dirty="0">
-              <a:solidFill>
-                <a:prstClr val="black"/>
-              </a:solidFill>
-            </a:endParaRPr>
           </a:p>
         </p:txBody>
       </p:sp>
@@ -8695,7 +8564,7 @@
           <a:lstStyle/>
           <a:p>
             <a:r>
-              <a:rPr lang="en-US" dirty="0" smtClean="0">
+              <a:rPr lang="en-US" dirty="0">
                 <a:solidFill>
                   <a:prstClr val="black"/>
                 </a:solidFill>
@@ -8705,18 +8574,13 @@
           </a:p>
           <a:p>
             <a:r>
-              <a:rPr lang="en-US" dirty="0" smtClean="0">
+              <a:rPr lang="en-US" dirty="0">
                 <a:solidFill>
                   <a:prstClr val="black"/>
                 </a:solidFill>
               </a:rPr>
               <a:t>Check Valve</a:t>
             </a:r>
-            <a:endParaRPr lang="en-US" dirty="0">
-              <a:solidFill>
-                <a:prstClr val="black"/>
-              </a:solidFill>
-            </a:endParaRPr>
           </a:p>
         </p:txBody>
       </p:sp>
@@ -8860,18 +8724,13 @@
           <a:lstStyle/>
           <a:p>
             <a:r>
-              <a:rPr lang="en-US" dirty="0" smtClean="0">
+              <a:rPr lang="en-US" dirty="0">
                 <a:solidFill>
                   <a:prstClr val="black"/>
                 </a:solidFill>
               </a:rPr>
               <a:t>Exhaust</a:t>
             </a:r>
-            <a:endParaRPr lang="en-US" dirty="0">
-              <a:solidFill>
-                <a:prstClr val="black"/>
-              </a:solidFill>
-            </a:endParaRPr>
           </a:p>
         </p:txBody>
       </p:sp>
@@ -8879,6 +8738,66 @@
     <p:extLst>
       <p:ext uri="{BB962C8B-B14F-4D97-AF65-F5344CB8AC3E}">
         <p14:creationId xmlns:p14="http://schemas.microsoft.com/office/powerpoint/2010/main" val="2829107249"/>
+      </p:ext>
+    </p:extLst>
+  </p:cSld>
+  <p:clrMapOvr>
+    <a:masterClrMapping/>
+  </p:clrMapOvr>
+</p:sld>
+</file>
+
+<file path=ppt/slides/slide4.xml><?xml version="1.0" encoding="utf-8"?>
+<p:sld xmlns:a="http://schemas.openxmlformats.org/drawingml/2006/main" xmlns:r="http://schemas.openxmlformats.org/officeDocument/2006/relationships" xmlns:p="http://schemas.openxmlformats.org/presentationml/2006/main">
+  <p:cSld>
+    <p:spTree>
+      <p:nvGrpSpPr>
+        <p:cNvPr id="1" name=""/>
+        <p:cNvGrpSpPr/>
+        <p:nvPr/>
+      </p:nvGrpSpPr>
+      <p:grpSpPr>
+        <a:xfrm>
+          <a:off x="0" y="0"/>
+          <a:ext cx="0" cy="0"/>
+          <a:chOff x="0" y="0"/>
+          <a:chExt cx="0" cy="0"/>
+        </a:xfrm>
+      </p:grpSpPr>
+      <p:pic>
+        <p:nvPicPr>
+          <p:cNvPr id="2" name="Picture 1">
+            <a:extLst>
+              <a:ext uri="{FF2B5EF4-FFF2-40B4-BE49-F238E27FC236}">
+                <a16:creationId xmlns:a16="http://schemas.microsoft.com/office/drawing/2014/main" id="{3C510545-AC06-4315-A3ED-D1E329930A8B}"/>
+              </a:ext>
+            </a:extLst>
+          </p:cNvPr>
+          <p:cNvPicPr>
+            <a:picLocks noChangeAspect="1"/>
+          </p:cNvPicPr>
+          <p:nvPr/>
+        </p:nvPicPr>
+        <p:blipFill>
+          <a:blip r:embed="rId2"/>
+          <a:stretch>
+            <a:fillRect/>
+          </a:stretch>
+        </p:blipFill>
+        <p:spPr>
+          <a:xfrm>
+            <a:off x="0" y="22074"/>
+            <a:ext cx="9144000" cy="6813852"/>
+          </a:xfrm>
+          <a:prstGeom prst="rect">
+            <a:avLst/>
+          </a:prstGeom>
+        </p:spPr>
+      </p:pic>
+    </p:spTree>
+    <p:extLst>
+      <p:ext uri="{BB962C8B-B14F-4D97-AF65-F5344CB8AC3E}">
+        <p14:creationId xmlns:p14="http://schemas.microsoft.com/office/powerpoint/2010/main" val="2128192829"/>
       </p:ext>
     </p:extLst>
   </p:cSld>

</xml_diff>

<commit_message>
Tweak respiratory volume handling. Lots of documentation updates in preperation for release.
</commit_message>
<xml_diff>
--- a/docs/Figures/AnesthesiaMachineWorking.pptx
+++ b/docs/Figures/AnesthesiaMachineWorking.pptx
@@ -6,13 +6,12 @@
     <p:sldMasterId id="2147483672" r:id="rId2"/>
   </p:sldMasterIdLst>
   <p:notesMasterIdLst>
-    <p:notesMasterId r:id="rId7"/>
+    <p:notesMasterId r:id="rId6"/>
   </p:notesMasterIdLst>
   <p:sldIdLst>
-    <p:sldId id="266" r:id="rId3"/>
-    <p:sldId id="269" r:id="rId4"/>
-    <p:sldId id="271" r:id="rId5"/>
-    <p:sldId id="272" r:id="rId6"/>
+    <p:sldId id="269" r:id="rId3"/>
+    <p:sldId id="271" r:id="rId4"/>
+    <p:sldId id="272" r:id="rId5"/>
   </p:sldIdLst>
   <p:sldSz cx="9144000" cy="6858000" type="screen4x3"/>
   <p:notesSz cx="6996113" cy="9282113"/>
@@ -212,7 +211,7 @@
           <a:p>
             <a:fld id="{7B126BB8-5932-4ACC-8CD5-328D9DA138C9}" type="datetimeFigureOut">
               <a:rPr lang="en-US" smtClean="0"/>
-              <a:t>10/15/2019</a:t>
+              <a:t>1/7/2020</a:t>
             </a:fld>
             <a:endParaRPr lang="en-US"/>
           </a:p>
@@ -658,7 +657,7 @@
           <a:p>
             <a:fld id="{9E9AFD63-10BD-4598-9E1E-9FFECB76D2D7}" type="datetimeFigureOut">
               <a:rPr lang="en-US" smtClean="0"/>
-              <a:t>10/15/2019</a:t>
+              <a:t>1/7/2020</a:t>
             </a:fld>
             <a:endParaRPr lang="en-US"/>
           </a:p>
@@ -826,7 +825,7 @@
           <a:p>
             <a:fld id="{9E9AFD63-10BD-4598-9E1E-9FFECB76D2D7}" type="datetimeFigureOut">
               <a:rPr lang="en-US" smtClean="0"/>
-              <a:t>10/15/2019</a:t>
+              <a:t>1/7/2020</a:t>
             </a:fld>
             <a:endParaRPr lang="en-US"/>
           </a:p>
@@ -1004,7 +1003,7 @@
           <a:p>
             <a:fld id="{9E9AFD63-10BD-4598-9E1E-9FFECB76D2D7}" type="datetimeFigureOut">
               <a:rPr lang="en-US" smtClean="0"/>
-              <a:t>10/15/2019</a:t>
+              <a:t>1/7/2020</a:t>
             </a:fld>
             <a:endParaRPr lang="en-US"/>
           </a:p>
@@ -2759,7 +2758,7 @@
           <a:p>
             <a:fld id="{9E9AFD63-10BD-4598-9E1E-9FFECB76D2D7}" type="datetimeFigureOut">
               <a:rPr lang="en-US" smtClean="0"/>
-              <a:t>10/15/2019</a:t>
+              <a:t>1/7/2020</a:t>
             </a:fld>
             <a:endParaRPr lang="en-US"/>
           </a:p>
@@ -3203,7 +3202,7 @@
           <a:p>
             <a:fld id="{9E9AFD63-10BD-4598-9E1E-9FFECB76D2D7}" type="datetimeFigureOut">
               <a:rPr lang="en-US" smtClean="0"/>
-              <a:t>10/15/2019</a:t>
+              <a:t>1/7/2020</a:t>
             </a:fld>
             <a:endParaRPr lang="en-US"/>
           </a:p>
@@ -3488,7 +3487,7 @@
           <a:p>
             <a:fld id="{9E9AFD63-10BD-4598-9E1E-9FFECB76D2D7}" type="datetimeFigureOut">
               <a:rPr lang="en-US" smtClean="0"/>
-              <a:t>10/15/2019</a:t>
+              <a:t>1/7/2020</a:t>
             </a:fld>
             <a:endParaRPr lang="en-US"/>
           </a:p>
@@ -3907,7 +3906,7 @@
           <a:p>
             <a:fld id="{9E9AFD63-10BD-4598-9E1E-9FFECB76D2D7}" type="datetimeFigureOut">
               <a:rPr lang="en-US" smtClean="0"/>
-              <a:t>10/15/2019</a:t>
+              <a:t>1/7/2020</a:t>
             </a:fld>
             <a:endParaRPr lang="en-US"/>
           </a:p>
@@ -4024,7 +4023,7 @@
           <a:p>
             <a:fld id="{9E9AFD63-10BD-4598-9E1E-9FFECB76D2D7}" type="datetimeFigureOut">
               <a:rPr lang="en-US" smtClean="0"/>
-              <a:t>10/15/2019</a:t>
+              <a:t>1/7/2020</a:t>
             </a:fld>
             <a:endParaRPr lang="en-US"/>
           </a:p>
@@ -4119,7 +4118,7 @@
           <a:p>
             <a:fld id="{9E9AFD63-10BD-4598-9E1E-9FFECB76D2D7}" type="datetimeFigureOut">
               <a:rPr lang="en-US" smtClean="0"/>
-              <a:t>10/15/2019</a:t>
+              <a:t>1/7/2020</a:t>
             </a:fld>
             <a:endParaRPr lang="en-US"/>
           </a:p>
@@ -4394,7 +4393,7 @@
           <a:p>
             <a:fld id="{9E9AFD63-10BD-4598-9E1E-9FFECB76D2D7}" type="datetimeFigureOut">
               <a:rPr lang="en-US" smtClean="0"/>
-              <a:t>10/15/2019</a:t>
+              <a:t>1/7/2020</a:t>
             </a:fld>
             <a:endParaRPr lang="en-US"/>
           </a:p>
@@ -4646,7 +4645,7 @@
           <a:p>
             <a:fld id="{9E9AFD63-10BD-4598-9E1E-9FFECB76D2D7}" type="datetimeFigureOut">
               <a:rPr lang="en-US" smtClean="0"/>
-              <a:t>10/15/2019</a:t>
+              <a:t>1/7/2020</a:t>
             </a:fld>
             <a:endParaRPr lang="en-US"/>
           </a:p>
@@ -4857,7 +4856,7 @@
           <a:p>
             <a:fld id="{9E9AFD63-10BD-4598-9E1E-9FFECB76D2D7}" type="datetimeFigureOut">
               <a:rPr lang="en-US" smtClean="0"/>
-              <a:t>10/15/2019</a:t>
+              <a:t>1/7/2020</a:t>
             </a:fld>
             <a:endParaRPr lang="en-US"/>
           </a:p>
@@ -6017,13 +6016,321 @@
       </p:grpSpPr>
       <p:sp>
         <p:nvSpPr>
-          <p:cNvPr id="18" name="Down Arrow 17"/>
+          <p:cNvPr id="4" name="Rectangle 3"/>
           <p:cNvSpPr/>
           <p:nvPr/>
         </p:nvSpPr>
         <p:spPr>
+          <a:xfrm>
+            <a:off x="1073968" y="914400"/>
+            <a:ext cx="2507432" cy="914400"/>
+          </a:xfrm>
+          <a:prstGeom prst="rect">
+            <a:avLst/>
+          </a:prstGeom>
+        </p:spPr>
+        <p:style>
+          <a:lnRef idx="2">
+            <a:schemeClr val="accent1">
+              <a:shade val="50000"/>
+            </a:schemeClr>
+          </a:lnRef>
+          <a:fillRef idx="1">
+            <a:schemeClr val="accent1"/>
+          </a:fillRef>
+          <a:effectRef idx="0">
+            <a:schemeClr val="accent1"/>
+          </a:effectRef>
+          <a:fontRef idx="minor">
+            <a:schemeClr val="lt1"/>
+          </a:fontRef>
+        </p:style>
+        <p:txBody>
+          <a:bodyPr rtlCol="0" anchor="t" anchorCtr="0"/>
+          <a:lstStyle/>
+          <a:p>
+            <a:pPr algn="ctr"/>
+            <a:r>
+              <a:rPr lang="en-US" sz="1050" b="1" u="sng" dirty="0">
+                <a:solidFill>
+                  <a:prstClr val="white"/>
+                </a:solidFill>
+              </a:rPr>
+              <a:t>Inspiration Phase</a:t>
+            </a:r>
+          </a:p>
+          <a:p>
+            <a:pPr marL="171450" indent="-171450">
+              <a:buFont typeface="Arial" panose="020B0604020202020204" pitchFamily="34" charset="0"/>
+              <a:buChar char="•"/>
+            </a:pPr>
+            <a:r>
+              <a:rPr lang="en-US" sz="1050" dirty="0">
+                <a:solidFill>
+                  <a:prstClr val="white"/>
+                </a:solidFill>
+              </a:rPr>
+              <a:t>Constant ventilator pressure applied</a:t>
+            </a:r>
+          </a:p>
+          <a:p>
+            <a:pPr marL="171450" indent="-171450">
+              <a:buFont typeface="Arial" panose="020B0604020202020204" pitchFamily="34" charset="0"/>
+              <a:buChar char="•"/>
+            </a:pPr>
+            <a:r>
+              <a:rPr lang="en-US" sz="1050" dirty="0">
+                <a:solidFill>
+                  <a:prstClr val="white"/>
+                </a:solidFill>
+              </a:rPr>
+              <a:t>Inhalation valve opened</a:t>
+            </a:r>
+          </a:p>
+          <a:p>
+            <a:pPr marL="171450" indent="-171450">
+              <a:buFont typeface="Arial" panose="020B0604020202020204" pitchFamily="34" charset="0"/>
+              <a:buChar char="•"/>
+            </a:pPr>
+            <a:r>
+              <a:rPr lang="en-US" sz="1050" dirty="0">
+                <a:solidFill>
+                  <a:prstClr val="white"/>
+                </a:solidFill>
+              </a:rPr>
+              <a:t>Exhalation valve closed</a:t>
+            </a:r>
+          </a:p>
+        </p:txBody>
+      </p:sp>
+      <p:sp>
+        <p:nvSpPr>
+          <p:cNvPr id="11" name="Rectangle 10"/>
+          <p:cNvSpPr/>
+          <p:nvPr/>
+        </p:nvSpPr>
+        <p:spPr>
+          <a:xfrm>
+            <a:off x="4350567" y="914400"/>
+            <a:ext cx="2507432" cy="914400"/>
+          </a:xfrm>
+          <a:prstGeom prst="rect">
+            <a:avLst/>
+          </a:prstGeom>
+        </p:spPr>
+        <p:style>
+          <a:lnRef idx="2">
+            <a:schemeClr val="accent1">
+              <a:shade val="50000"/>
+            </a:schemeClr>
+          </a:lnRef>
+          <a:fillRef idx="1">
+            <a:schemeClr val="accent1"/>
+          </a:fillRef>
+          <a:effectRef idx="0">
+            <a:schemeClr val="accent1"/>
+          </a:effectRef>
+          <a:fontRef idx="minor">
+            <a:schemeClr val="lt1"/>
+          </a:fontRef>
+        </p:style>
+        <p:txBody>
+          <a:bodyPr rtlCol="0" anchor="t" anchorCtr="0"/>
+          <a:lstStyle/>
+          <a:p>
+            <a:pPr algn="ctr"/>
+            <a:r>
+              <a:rPr lang="en-US" sz="1050" b="1" u="sng" dirty="0">
+                <a:solidFill>
+                  <a:prstClr val="white"/>
+                </a:solidFill>
+              </a:rPr>
+              <a:t>Inspiration To Expiration Transition Phase</a:t>
+            </a:r>
+          </a:p>
+          <a:p>
+            <a:pPr marL="171450" indent="-171450">
+              <a:buFont typeface="Arial" panose="020B0604020202020204" pitchFamily="34" charset="0"/>
+              <a:buChar char="•"/>
+            </a:pPr>
+            <a:r>
+              <a:rPr lang="en-US" sz="1050" dirty="0">
+                <a:solidFill>
+                  <a:prstClr val="white"/>
+                </a:solidFill>
+              </a:rPr>
+              <a:t>Transition when inspiration time is achieved (via I:E Ratio)</a:t>
+            </a:r>
+          </a:p>
+        </p:txBody>
+      </p:sp>
+      <p:sp>
+        <p:nvSpPr>
+          <p:cNvPr id="12" name="Rectangle 11"/>
+          <p:cNvSpPr/>
+          <p:nvPr/>
+        </p:nvSpPr>
+        <p:spPr>
+          <a:xfrm>
+            <a:off x="4343400" y="2514600"/>
+            <a:ext cx="2522648" cy="914400"/>
+          </a:xfrm>
+          <a:prstGeom prst="rect">
+            <a:avLst/>
+          </a:prstGeom>
+        </p:spPr>
+        <p:style>
+          <a:lnRef idx="2">
+            <a:schemeClr val="accent1">
+              <a:shade val="50000"/>
+            </a:schemeClr>
+          </a:lnRef>
+          <a:fillRef idx="1">
+            <a:schemeClr val="accent1"/>
+          </a:fillRef>
+          <a:effectRef idx="0">
+            <a:schemeClr val="accent1"/>
+          </a:effectRef>
+          <a:fontRef idx="minor">
+            <a:schemeClr val="lt1"/>
+          </a:fontRef>
+        </p:style>
+        <p:txBody>
+          <a:bodyPr rtlCol="0" anchor="t" anchorCtr="0"/>
+          <a:lstStyle/>
+          <a:p>
+            <a:pPr algn="ctr"/>
+            <a:r>
+              <a:rPr lang="en-US" sz="1050" b="1" u="sng" dirty="0">
+                <a:solidFill>
+                  <a:prstClr val="white"/>
+                </a:solidFill>
+              </a:rPr>
+              <a:t>Expiration Phase</a:t>
+            </a:r>
+          </a:p>
+          <a:p>
+            <a:pPr marL="171450" indent="-171450">
+              <a:buFont typeface="Arial" panose="020B0604020202020204" pitchFamily="34" charset="0"/>
+              <a:buChar char="•"/>
+            </a:pPr>
+            <a:r>
+              <a:rPr lang="en-US" sz="1050" dirty="0">
+                <a:solidFill>
+                  <a:prstClr val="white"/>
+                </a:solidFill>
+              </a:rPr>
+              <a:t>Set ventilator pressure to positive end expired pressure (PEEP)</a:t>
+            </a:r>
+          </a:p>
+          <a:p>
+            <a:pPr marL="171450" indent="-171450">
+              <a:buFont typeface="Arial" panose="020B0604020202020204" pitchFamily="34" charset="0"/>
+              <a:buChar char="•"/>
+            </a:pPr>
+            <a:r>
+              <a:rPr lang="en-US" sz="1050" dirty="0">
+                <a:solidFill>
+                  <a:prstClr val="white"/>
+                </a:solidFill>
+              </a:rPr>
+              <a:t>Inhalation valve closed</a:t>
+            </a:r>
+          </a:p>
+          <a:p>
+            <a:pPr marL="171450" indent="-171450">
+              <a:buFont typeface="Arial" panose="020B0604020202020204" pitchFamily="34" charset="0"/>
+              <a:buChar char="•"/>
+            </a:pPr>
+            <a:r>
+              <a:rPr lang="en-US" sz="1050" dirty="0">
+                <a:solidFill>
+                  <a:prstClr val="white"/>
+                </a:solidFill>
+              </a:rPr>
+              <a:t>Exhalation valve opened</a:t>
+            </a:r>
+          </a:p>
+        </p:txBody>
+      </p:sp>
+      <p:sp>
+        <p:nvSpPr>
+          <p:cNvPr id="13" name="Rectangle 12"/>
+          <p:cNvSpPr/>
+          <p:nvPr/>
+        </p:nvSpPr>
+        <p:spPr>
+          <a:xfrm>
+            <a:off x="1066801" y="2514600"/>
+            <a:ext cx="2522648" cy="914400"/>
+          </a:xfrm>
+          <a:prstGeom prst="rect">
+            <a:avLst/>
+          </a:prstGeom>
+        </p:spPr>
+        <p:style>
+          <a:lnRef idx="2">
+            <a:schemeClr val="accent1">
+              <a:shade val="50000"/>
+            </a:schemeClr>
+          </a:lnRef>
+          <a:fillRef idx="1">
+            <a:schemeClr val="accent1"/>
+          </a:fillRef>
+          <a:effectRef idx="0">
+            <a:schemeClr val="accent1"/>
+          </a:effectRef>
+          <a:fontRef idx="minor">
+            <a:schemeClr val="lt1"/>
+          </a:fontRef>
+        </p:style>
+        <p:txBody>
+          <a:bodyPr rtlCol="0" anchor="t" anchorCtr="0"/>
+          <a:lstStyle/>
+          <a:p>
+            <a:pPr algn="ctr"/>
+            <a:r>
+              <a:rPr lang="en-US" sz="1050" b="1" u="sng" dirty="0">
+                <a:solidFill>
+                  <a:prstClr val="white"/>
+                </a:solidFill>
+              </a:rPr>
+              <a:t>Expiration To Inspiration Transition Phase</a:t>
+            </a:r>
+          </a:p>
+          <a:p>
+            <a:pPr marL="171450" indent="-171450">
+              <a:buFont typeface="Arial" panose="020B0604020202020204" pitchFamily="34" charset="0"/>
+              <a:buChar char="•"/>
+            </a:pPr>
+            <a:r>
+              <a:rPr lang="en-US" sz="1050" dirty="0">
+                <a:solidFill>
+                  <a:prstClr val="white"/>
+                </a:solidFill>
+              </a:rPr>
+              <a:t>Transition when total cycle time is achieved (via Respiratory Rate Setting</a:t>
+            </a:r>
+            <a:r>
+              <a:rPr lang="en-US" sz="1050" b="1" u="sng" dirty="0">
+                <a:solidFill>
+                  <a:prstClr val="white"/>
+                </a:solidFill>
+              </a:rPr>
+              <a:t>)</a:t>
+            </a:r>
+          </a:p>
+        </p:txBody>
+      </p:sp>
+      <p:sp>
+        <p:nvSpPr>
+          <p:cNvPr id="15" name="Down Arrow 14"/>
+          <p:cNvSpPr/>
+          <p:nvPr/>
+        </p:nvSpPr>
+        <p:spPr>
           <a:xfrm rot="16200000">
-            <a:off x="2690379" y="1957820"/>
+            <a:off x="3733932" y="1104900"/>
             <a:ext cx="486640" cy="533400"/>
           </a:xfrm>
           <a:prstGeom prst="downArrow">
@@ -6061,282 +6368,13 @@
       </p:sp>
       <p:sp>
         <p:nvSpPr>
-          <p:cNvPr id="6" name="Rounded Rectangle 5"/>
+          <p:cNvPr id="16" name="Down Arrow 15"/>
           <p:cNvSpPr/>
           <p:nvPr/>
         </p:nvSpPr>
         <p:spPr>
           <a:xfrm>
-            <a:off x="609600" y="1891259"/>
-            <a:ext cx="1981199" cy="1928769"/>
-          </a:xfrm>
-          <a:prstGeom prst="roundRect">
-            <a:avLst/>
-          </a:prstGeom>
-        </p:spPr>
-        <p:style>
-          <a:lnRef idx="2">
-            <a:schemeClr val="accent1">
-              <a:shade val="50000"/>
-            </a:schemeClr>
-          </a:lnRef>
-          <a:fillRef idx="1">
-            <a:schemeClr val="accent1"/>
-          </a:fillRef>
-          <a:effectRef idx="0">
-            <a:schemeClr val="accent1"/>
-          </a:effectRef>
-          <a:fontRef idx="minor">
-            <a:schemeClr val="lt1"/>
-          </a:fontRef>
-        </p:style>
-        <p:txBody>
-          <a:bodyPr rtlCol="0" anchor="t" anchorCtr="0"/>
-          <a:lstStyle/>
-          <a:p>
-            <a:pPr algn="ctr"/>
-            <a:r>
-              <a:rPr lang="en-US" sz="1050" b="1" u="sng" dirty="0">
-                <a:solidFill>
-                  <a:prstClr val="white"/>
-                </a:solidFill>
-              </a:rPr>
-              <a:t>Preprocess</a:t>
-            </a:r>
-          </a:p>
-          <a:p>
-            <a:pPr marL="171450" indent="-171450">
-              <a:buFont typeface="Arial" panose="020B0604020202020204" pitchFamily="34" charset="0"/>
-              <a:buChar char="•"/>
-            </a:pPr>
-            <a:r>
-              <a:rPr lang="en-US" sz="1050" dirty="0" err="1"/>
-              <a:t>CalculateCyclePhase</a:t>
-            </a:r>
-            <a:endParaRPr lang="en-US" sz="1050" dirty="0"/>
-          </a:p>
-          <a:p>
-            <a:pPr marL="171450" indent="-171450">
-              <a:buFont typeface="Arial" panose="020B0604020202020204" pitchFamily="34" charset="0"/>
-              <a:buChar char="•"/>
-            </a:pPr>
-            <a:r>
-              <a:rPr lang="en-US" sz="1050" dirty="0" err="1"/>
-              <a:t>CalculateSourceStatus</a:t>
-            </a:r>
-            <a:endParaRPr lang="en-US" sz="1050" dirty="0"/>
-          </a:p>
-          <a:p>
-            <a:pPr marL="171450" indent="-171450">
-              <a:buFont typeface="Arial" panose="020B0604020202020204" pitchFamily="34" charset="0"/>
-              <a:buChar char="•"/>
-            </a:pPr>
-            <a:r>
-              <a:rPr lang="en-US" sz="1050" dirty="0" err="1"/>
-              <a:t>SetConnection</a:t>
-            </a:r>
-            <a:endParaRPr lang="en-US" sz="1050" dirty="0"/>
-          </a:p>
-          <a:p>
-            <a:pPr marL="171450" indent="-171450">
-              <a:buFont typeface="Arial" panose="020B0604020202020204" pitchFamily="34" charset="0"/>
-              <a:buChar char="•"/>
-            </a:pPr>
-            <a:r>
-              <a:rPr lang="en-US" sz="1050" dirty="0" err="1"/>
-              <a:t>CalculateValveResistances</a:t>
-            </a:r>
-            <a:endParaRPr lang="en-US" sz="1050" dirty="0"/>
-          </a:p>
-          <a:p>
-            <a:pPr marL="171450" indent="-171450">
-              <a:buFont typeface="Arial" panose="020B0604020202020204" pitchFamily="34" charset="0"/>
-              <a:buChar char="•"/>
-            </a:pPr>
-            <a:r>
-              <a:rPr lang="en-US" sz="1050" dirty="0" err="1"/>
-              <a:t>CalculateEquipmentLeak</a:t>
-            </a:r>
-            <a:endParaRPr lang="en-US" sz="1050" dirty="0"/>
-          </a:p>
-          <a:p>
-            <a:pPr marL="171450" indent="-171450">
-              <a:buFont typeface="Arial" panose="020B0604020202020204" pitchFamily="34" charset="0"/>
-              <a:buChar char="•"/>
-            </a:pPr>
-            <a:r>
-              <a:rPr lang="en-US" sz="1050" dirty="0" err="1"/>
-              <a:t>CalculateVentilator</a:t>
-            </a:r>
-            <a:endParaRPr lang="en-US" sz="1050" dirty="0"/>
-          </a:p>
-          <a:p>
-            <a:pPr marL="171450" indent="-171450">
-              <a:buFont typeface="Arial" panose="020B0604020202020204" pitchFamily="34" charset="0"/>
-              <a:buChar char="•"/>
-            </a:pPr>
-            <a:r>
-              <a:rPr lang="en-US" sz="1050" dirty="0" err="1"/>
-              <a:t>CalculateGasSource</a:t>
-            </a:r>
-            <a:endParaRPr lang="en-US" sz="1050" dirty="0"/>
-          </a:p>
-          <a:p>
-            <a:pPr marL="171450" indent="-171450">
-              <a:buFont typeface="Arial" panose="020B0604020202020204" pitchFamily="34" charset="0"/>
-              <a:buChar char="•"/>
-            </a:pPr>
-            <a:r>
-              <a:rPr lang="en-US" sz="1050" dirty="0" err="1"/>
-              <a:t>CheckReliefValve</a:t>
-            </a:r>
-            <a:endParaRPr lang="en-US" sz="1050" dirty="0"/>
-          </a:p>
-        </p:txBody>
-      </p:sp>
-      <p:sp>
-        <p:nvSpPr>
-          <p:cNvPr id="26" name="Rounded Rectangle 25"/>
-          <p:cNvSpPr/>
-          <p:nvPr/>
-        </p:nvSpPr>
-        <p:spPr>
-          <a:xfrm>
-            <a:off x="3298410" y="1905000"/>
-            <a:ext cx="2492789" cy="609599"/>
-          </a:xfrm>
-          <a:prstGeom prst="roundRect">
-            <a:avLst/>
-          </a:prstGeom>
-        </p:spPr>
-        <p:style>
-          <a:lnRef idx="2">
-            <a:schemeClr val="accent1">
-              <a:shade val="50000"/>
-            </a:schemeClr>
-          </a:lnRef>
-          <a:fillRef idx="1">
-            <a:schemeClr val="accent1"/>
-          </a:fillRef>
-          <a:effectRef idx="0">
-            <a:schemeClr val="accent1"/>
-          </a:effectRef>
-          <a:fontRef idx="minor">
-            <a:schemeClr val="lt1"/>
-          </a:fontRef>
-        </p:style>
-        <p:txBody>
-          <a:bodyPr rtlCol="0" anchor="t" anchorCtr="0"/>
-          <a:lstStyle/>
-          <a:p>
-            <a:pPr algn="ctr"/>
-            <a:r>
-              <a:rPr lang="en-US" sz="1050" b="1" u="sng" dirty="0">
-                <a:solidFill>
-                  <a:prstClr val="white"/>
-                </a:solidFill>
-              </a:rPr>
-              <a:t>Process</a:t>
-            </a:r>
-          </a:p>
-          <a:p>
-            <a:pPr marL="119063" indent="-119063">
-              <a:buFont typeface="Arial" pitchFamily="34" charset="0"/>
-              <a:buChar char="•"/>
-            </a:pPr>
-            <a:r>
-              <a:rPr lang="en-US" sz="1050" i="1" dirty="0"/>
-              <a:t>Combined Circuit Solved by Respiratory</a:t>
-            </a:r>
-          </a:p>
-          <a:p>
-            <a:pPr marL="119063" indent="-119063">
-              <a:buFont typeface="Arial" pitchFamily="34" charset="0"/>
-              <a:buChar char="•"/>
-            </a:pPr>
-            <a:r>
-              <a:rPr lang="en-US" sz="1050" dirty="0" err="1"/>
-              <a:t>CalculateScrubber</a:t>
-            </a:r>
-            <a:endParaRPr lang="en-US" sz="1050" dirty="0">
-              <a:solidFill>
-                <a:prstClr val="white"/>
-              </a:solidFill>
-            </a:endParaRPr>
-          </a:p>
-        </p:txBody>
-      </p:sp>
-      <p:sp>
-        <p:nvSpPr>
-          <p:cNvPr id="27" name="Rounded Rectangle 26"/>
-          <p:cNvSpPr/>
-          <p:nvPr/>
-        </p:nvSpPr>
-        <p:spPr>
-          <a:xfrm>
-            <a:off x="3298410" y="3215119"/>
-            <a:ext cx="2492789" cy="604909"/>
-          </a:xfrm>
-          <a:prstGeom prst="roundRect">
-            <a:avLst/>
-          </a:prstGeom>
-        </p:spPr>
-        <p:style>
-          <a:lnRef idx="2">
-            <a:schemeClr val="accent1">
-              <a:shade val="50000"/>
-            </a:schemeClr>
-          </a:lnRef>
-          <a:fillRef idx="1">
-            <a:schemeClr val="accent1"/>
-          </a:fillRef>
-          <a:effectRef idx="0">
-            <a:schemeClr val="accent1"/>
-          </a:effectRef>
-          <a:fontRef idx="minor">
-            <a:schemeClr val="lt1"/>
-          </a:fontRef>
-        </p:style>
-        <p:txBody>
-          <a:bodyPr rtlCol="0" anchor="t" anchorCtr="0"/>
-          <a:lstStyle/>
-          <a:p>
-            <a:pPr algn="ctr"/>
-            <a:r>
-              <a:rPr lang="en-US" sz="1050" b="1" u="sng" dirty="0" err="1">
-                <a:solidFill>
-                  <a:prstClr val="white"/>
-                </a:solidFill>
-              </a:rPr>
-              <a:t>PostProcess</a:t>
-            </a:r>
-            <a:endParaRPr lang="en-US" sz="1050" b="1" u="sng" dirty="0">
-              <a:solidFill>
-                <a:prstClr val="white"/>
-              </a:solidFill>
-            </a:endParaRPr>
-          </a:p>
-          <a:p>
-            <a:pPr marL="119063" indent="-119063">
-              <a:buFont typeface="Arial" pitchFamily="34" charset="0"/>
-              <a:buChar char="•"/>
-            </a:pPr>
-            <a:r>
-              <a:rPr lang="en-US" sz="1050" i="1" dirty="0"/>
-              <a:t>Combined Circuit Time Advanced by Respiratory</a:t>
-            </a:r>
-          </a:p>
-        </p:txBody>
-      </p:sp>
-      <p:sp>
-        <p:nvSpPr>
-          <p:cNvPr id="13" name="Down Arrow 12"/>
-          <p:cNvSpPr/>
-          <p:nvPr/>
-        </p:nvSpPr>
-        <p:spPr>
-          <a:xfrm rot="5400000">
-            <a:off x="2690379" y="3250874"/>
+            <a:off x="5361404" y="1906806"/>
             <a:ext cx="486640" cy="533400"/>
           </a:xfrm>
           <a:prstGeom prst="downArrow">
@@ -6374,13 +6412,13 @@
       </p:sp>
       <p:sp>
         <p:nvSpPr>
-          <p:cNvPr id="14" name="Down Arrow 13"/>
+          <p:cNvPr id="17" name="Down Arrow 16"/>
           <p:cNvSpPr/>
           <p:nvPr/>
         </p:nvSpPr>
         <p:spPr>
-          <a:xfrm>
-            <a:off x="4328679" y="2590800"/>
+          <a:xfrm rot="5400000">
+            <a:off x="3721663" y="2704587"/>
             <a:ext cx="486640" cy="533400"/>
           </a:xfrm>
           <a:prstGeom prst="downArrow">
@@ -6416,353 +6454,15 @@
           </a:p>
         </p:txBody>
       </p:sp>
-    </p:spTree>
-    <p:extLst>
-      <p:ext uri="{BB962C8B-B14F-4D97-AF65-F5344CB8AC3E}">
-        <p14:creationId xmlns:p14="http://schemas.microsoft.com/office/powerpoint/2010/main" val="4168358825"/>
-      </p:ext>
-    </p:extLst>
-  </p:cSld>
-  <p:clrMapOvr>
-    <a:masterClrMapping/>
-  </p:clrMapOvr>
-</p:sld>
-</file>
-
-<file path=ppt/slides/slide2.xml><?xml version="1.0" encoding="utf-8"?>
-<p:sld xmlns:a="http://schemas.openxmlformats.org/drawingml/2006/main" xmlns:r="http://schemas.openxmlformats.org/officeDocument/2006/relationships" xmlns:p="http://schemas.openxmlformats.org/presentationml/2006/main">
-  <p:cSld>
-    <p:spTree>
-      <p:nvGrpSpPr>
-        <p:cNvPr id="1" name=""/>
-        <p:cNvGrpSpPr/>
-        <p:nvPr/>
-      </p:nvGrpSpPr>
-      <p:grpSpPr>
-        <a:xfrm>
-          <a:off x="0" y="0"/>
-          <a:ext cx="0" cy="0"/>
-          <a:chOff x="0" y="0"/>
-          <a:chExt cx="0" cy="0"/>
-        </a:xfrm>
-      </p:grpSpPr>
-      <p:sp>
-        <p:nvSpPr>
-          <p:cNvPr id="4" name="Rectangle 3"/>
+      <p:sp>
+        <p:nvSpPr>
+          <p:cNvPr id="18" name="Down Arrow 17"/>
           <p:cNvSpPr/>
           <p:nvPr/>
         </p:nvSpPr>
         <p:spPr>
-          <a:xfrm>
-            <a:off x="1073968" y="914400"/>
-            <a:ext cx="2507432" cy="914400"/>
-          </a:xfrm>
-          <a:prstGeom prst="rect">
-            <a:avLst/>
-          </a:prstGeom>
-        </p:spPr>
-        <p:style>
-          <a:lnRef idx="2">
-            <a:schemeClr val="accent1">
-              <a:shade val="50000"/>
-            </a:schemeClr>
-          </a:lnRef>
-          <a:fillRef idx="1">
-            <a:schemeClr val="accent1"/>
-          </a:fillRef>
-          <a:effectRef idx="0">
-            <a:schemeClr val="accent1"/>
-          </a:effectRef>
-          <a:fontRef idx="minor">
-            <a:schemeClr val="lt1"/>
-          </a:fontRef>
-        </p:style>
-        <p:txBody>
-          <a:bodyPr rtlCol="0" anchor="t" anchorCtr="0"/>
-          <a:lstStyle/>
-          <a:p>
-            <a:pPr algn="ctr"/>
-            <a:r>
-              <a:rPr lang="en-US" sz="1050" b="1" u="sng" dirty="0">
-                <a:solidFill>
-                  <a:prstClr val="white"/>
-                </a:solidFill>
-              </a:rPr>
-              <a:t>Inspiration Phase</a:t>
-            </a:r>
-          </a:p>
-          <a:p>
-            <a:pPr marL="171450" indent="-171450">
-              <a:buFont typeface="Arial" panose="020B0604020202020204" pitchFamily="34" charset="0"/>
-              <a:buChar char="•"/>
-            </a:pPr>
-            <a:r>
-              <a:rPr lang="en-US" sz="1050" dirty="0">
-                <a:solidFill>
-                  <a:prstClr val="white"/>
-                </a:solidFill>
-              </a:rPr>
-              <a:t>Constant ventilator pressure applied</a:t>
-            </a:r>
-          </a:p>
-          <a:p>
-            <a:pPr marL="171450" indent="-171450">
-              <a:buFont typeface="Arial" panose="020B0604020202020204" pitchFamily="34" charset="0"/>
-              <a:buChar char="•"/>
-            </a:pPr>
-            <a:r>
-              <a:rPr lang="en-US" sz="1050" dirty="0">
-                <a:solidFill>
-                  <a:prstClr val="white"/>
-                </a:solidFill>
-              </a:rPr>
-              <a:t>Inhalation valve opened</a:t>
-            </a:r>
-          </a:p>
-          <a:p>
-            <a:pPr marL="171450" indent="-171450">
-              <a:buFont typeface="Arial" panose="020B0604020202020204" pitchFamily="34" charset="0"/>
-              <a:buChar char="•"/>
-            </a:pPr>
-            <a:r>
-              <a:rPr lang="en-US" sz="1050" dirty="0">
-                <a:solidFill>
-                  <a:prstClr val="white"/>
-                </a:solidFill>
-              </a:rPr>
-              <a:t>Exhalation valve closed</a:t>
-            </a:r>
-          </a:p>
-        </p:txBody>
-      </p:sp>
-      <p:sp>
-        <p:nvSpPr>
-          <p:cNvPr id="11" name="Rectangle 10"/>
-          <p:cNvSpPr/>
-          <p:nvPr/>
-        </p:nvSpPr>
-        <p:spPr>
-          <a:xfrm>
-            <a:off x="4350567" y="914400"/>
-            <a:ext cx="2507432" cy="914400"/>
-          </a:xfrm>
-          <a:prstGeom prst="rect">
-            <a:avLst/>
-          </a:prstGeom>
-        </p:spPr>
-        <p:style>
-          <a:lnRef idx="2">
-            <a:schemeClr val="accent1">
-              <a:shade val="50000"/>
-            </a:schemeClr>
-          </a:lnRef>
-          <a:fillRef idx="1">
-            <a:schemeClr val="accent1"/>
-          </a:fillRef>
-          <a:effectRef idx="0">
-            <a:schemeClr val="accent1"/>
-          </a:effectRef>
-          <a:fontRef idx="minor">
-            <a:schemeClr val="lt1"/>
-          </a:fontRef>
-        </p:style>
-        <p:txBody>
-          <a:bodyPr rtlCol="0" anchor="t" anchorCtr="0"/>
-          <a:lstStyle/>
-          <a:p>
-            <a:pPr algn="ctr"/>
-            <a:r>
-              <a:rPr lang="en-US" sz="1050" b="1" u="sng" dirty="0">
-                <a:solidFill>
-                  <a:prstClr val="white"/>
-                </a:solidFill>
-              </a:rPr>
-              <a:t>Inspiration To Expiration Transition Phase</a:t>
-            </a:r>
-          </a:p>
-          <a:p>
-            <a:pPr marL="171450" indent="-171450">
-              <a:buFont typeface="Arial" panose="020B0604020202020204" pitchFamily="34" charset="0"/>
-              <a:buChar char="•"/>
-            </a:pPr>
-            <a:r>
-              <a:rPr lang="en-US" sz="1050" dirty="0">
-                <a:solidFill>
-                  <a:prstClr val="white"/>
-                </a:solidFill>
-              </a:rPr>
-              <a:t>Transition when inspiration time is achieved (via I:E Ratio)</a:t>
-            </a:r>
-          </a:p>
-        </p:txBody>
-      </p:sp>
-      <p:sp>
-        <p:nvSpPr>
-          <p:cNvPr id="12" name="Rectangle 11"/>
-          <p:cNvSpPr/>
-          <p:nvPr/>
-        </p:nvSpPr>
-        <p:spPr>
-          <a:xfrm>
-            <a:off x="4343400" y="2514600"/>
-            <a:ext cx="2522648" cy="914400"/>
-          </a:xfrm>
-          <a:prstGeom prst="rect">
-            <a:avLst/>
-          </a:prstGeom>
-        </p:spPr>
-        <p:style>
-          <a:lnRef idx="2">
-            <a:schemeClr val="accent1">
-              <a:shade val="50000"/>
-            </a:schemeClr>
-          </a:lnRef>
-          <a:fillRef idx="1">
-            <a:schemeClr val="accent1"/>
-          </a:fillRef>
-          <a:effectRef idx="0">
-            <a:schemeClr val="accent1"/>
-          </a:effectRef>
-          <a:fontRef idx="minor">
-            <a:schemeClr val="lt1"/>
-          </a:fontRef>
-        </p:style>
-        <p:txBody>
-          <a:bodyPr rtlCol="0" anchor="t" anchorCtr="0"/>
-          <a:lstStyle/>
-          <a:p>
-            <a:pPr algn="ctr"/>
-            <a:r>
-              <a:rPr lang="en-US" sz="1050" b="1" u="sng" dirty="0">
-                <a:solidFill>
-                  <a:prstClr val="white"/>
-                </a:solidFill>
-              </a:rPr>
-              <a:t>Expiration Phase</a:t>
-            </a:r>
-          </a:p>
-          <a:p>
-            <a:pPr marL="171450" indent="-171450">
-              <a:buFont typeface="Arial" panose="020B0604020202020204" pitchFamily="34" charset="0"/>
-              <a:buChar char="•"/>
-            </a:pPr>
-            <a:r>
-              <a:rPr lang="en-US" sz="1050" dirty="0">
-                <a:solidFill>
-                  <a:prstClr val="white"/>
-                </a:solidFill>
-              </a:rPr>
-              <a:t>Set ventilator pressure to positive end expired pressure (PEEP)</a:t>
-            </a:r>
-          </a:p>
-          <a:p>
-            <a:pPr marL="171450" indent="-171450">
-              <a:buFont typeface="Arial" panose="020B0604020202020204" pitchFamily="34" charset="0"/>
-              <a:buChar char="•"/>
-            </a:pPr>
-            <a:r>
-              <a:rPr lang="en-US" sz="1050" dirty="0">
-                <a:solidFill>
-                  <a:prstClr val="white"/>
-                </a:solidFill>
-              </a:rPr>
-              <a:t>Inhalation valve closed</a:t>
-            </a:r>
-          </a:p>
-          <a:p>
-            <a:pPr marL="171450" indent="-171450">
-              <a:buFont typeface="Arial" panose="020B0604020202020204" pitchFamily="34" charset="0"/>
-              <a:buChar char="•"/>
-            </a:pPr>
-            <a:r>
-              <a:rPr lang="en-US" sz="1050" dirty="0">
-                <a:solidFill>
-                  <a:prstClr val="white"/>
-                </a:solidFill>
-              </a:rPr>
-              <a:t>Exhalation valve opened</a:t>
-            </a:r>
-          </a:p>
-        </p:txBody>
-      </p:sp>
-      <p:sp>
-        <p:nvSpPr>
-          <p:cNvPr id="13" name="Rectangle 12"/>
-          <p:cNvSpPr/>
-          <p:nvPr/>
-        </p:nvSpPr>
-        <p:spPr>
-          <a:xfrm>
-            <a:off x="1066801" y="2514600"/>
-            <a:ext cx="2522648" cy="914400"/>
-          </a:xfrm>
-          <a:prstGeom prst="rect">
-            <a:avLst/>
-          </a:prstGeom>
-        </p:spPr>
-        <p:style>
-          <a:lnRef idx="2">
-            <a:schemeClr val="accent1">
-              <a:shade val="50000"/>
-            </a:schemeClr>
-          </a:lnRef>
-          <a:fillRef idx="1">
-            <a:schemeClr val="accent1"/>
-          </a:fillRef>
-          <a:effectRef idx="0">
-            <a:schemeClr val="accent1"/>
-          </a:effectRef>
-          <a:fontRef idx="minor">
-            <a:schemeClr val="lt1"/>
-          </a:fontRef>
-        </p:style>
-        <p:txBody>
-          <a:bodyPr rtlCol="0" anchor="t" anchorCtr="0"/>
-          <a:lstStyle/>
-          <a:p>
-            <a:pPr algn="ctr"/>
-            <a:r>
-              <a:rPr lang="en-US" sz="1050" b="1" u="sng" dirty="0">
-                <a:solidFill>
-                  <a:prstClr val="white"/>
-                </a:solidFill>
-              </a:rPr>
-              <a:t>Expiration To Inspiration Transition Phase</a:t>
-            </a:r>
-          </a:p>
-          <a:p>
-            <a:pPr marL="171450" indent="-171450">
-              <a:buFont typeface="Arial" panose="020B0604020202020204" pitchFamily="34" charset="0"/>
-              <a:buChar char="•"/>
-            </a:pPr>
-            <a:r>
-              <a:rPr lang="en-US" sz="1050" dirty="0">
-                <a:solidFill>
-                  <a:prstClr val="white"/>
-                </a:solidFill>
-              </a:rPr>
-              <a:t>Transition when total cycle time is achieved (via Respiratory Rate Setting</a:t>
-            </a:r>
-            <a:r>
-              <a:rPr lang="en-US" sz="1050" b="1" u="sng" dirty="0">
-                <a:solidFill>
-                  <a:prstClr val="white"/>
-                </a:solidFill>
-              </a:rPr>
-              <a:t>)</a:t>
-            </a:r>
-          </a:p>
-        </p:txBody>
-      </p:sp>
-      <p:sp>
-        <p:nvSpPr>
-          <p:cNvPr id="15" name="Down Arrow 14"/>
-          <p:cNvSpPr/>
-          <p:nvPr/>
-        </p:nvSpPr>
-        <p:spPr>
-          <a:xfrm rot="16200000">
-            <a:off x="3733932" y="1104900"/>
+          <a:xfrm rot="10800000">
+            <a:off x="2084805" y="1905000"/>
             <a:ext cx="486640" cy="533400"/>
           </a:xfrm>
           <a:prstGeom prst="downArrow">
@@ -6798,138 +6498,6 @@
           </a:p>
         </p:txBody>
       </p:sp>
-      <p:sp>
-        <p:nvSpPr>
-          <p:cNvPr id="16" name="Down Arrow 15"/>
-          <p:cNvSpPr/>
-          <p:nvPr/>
-        </p:nvSpPr>
-        <p:spPr>
-          <a:xfrm>
-            <a:off x="5361404" y="1906806"/>
-            <a:ext cx="486640" cy="533400"/>
-          </a:xfrm>
-          <a:prstGeom prst="downArrow">
-            <a:avLst/>
-          </a:prstGeom>
-        </p:spPr>
-        <p:style>
-          <a:lnRef idx="2">
-            <a:schemeClr val="dk1">
-              <a:shade val="50000"/>
-            </a:schemeClr>
-          </a:lnRef>
-          <a:fillRef idx="1">
-            <a:schemeClr val="dk1"/>
-          </a:fillRef>
-          <a:effectRef idx="0">
-            <a:schemeClr val="dk1"/>
-          </a:effectRef>
-          <a:fontRef idx="minor">
-            <a:schemeClr val="lt1"/>
-          </a:fontRef>
-        </p:style>
-        <p:txBody>
-          <a:bodyPr rtlCol="0" anchor="ctr"/>
-          <a:lstStyle/>
-          <a:p>
-            <a:pPr algn="ctr"/>
-            <a:endParaRPr lang="en-US">
-              <a:solidFill>
-                <a:prstClr val="white"/>
-              </a:solidFill>
-            </a:endParaRPr>
-          </a:p>
-        </p:txBody>
-      </p:sp>
-      <p:sp>
-        <p:nvSpPr>
-          <p:cNvPr id="17" name="Down Arrow 16"/>
-          <p:cNvSpPr/>
-          <p:nvPr/>
-        </p:nvSpPr>
-        <p:spPr>
-          <a:xfrm rot="5400000">
-            <a:off x="3721663" y="2704587"/>
-            <a:ext cx="486640" cy="533400"/>
-          </a:xfrm>
-          <a:prstGeom prst="downArrow">
-            <a:avLst/>
-          </a:prstGeom>
-        </p:spPr>
-        <p:style>
-          <a:lnRef idx="2">
-            <a:schemeClr val="dk1">
-              <a:shade val="50000"/>
-            </a:schemeClr>
-          </a:lnRef>
-          <a:fillRef idx="1">
-            <a:schemeClr val="dk1"/>
-          </a:fillRef>
-          <a:effectRef idx="0">
-            <a:schemeClr val="dk1"/>
-          </a:effectRef>
-          <a:fontRef idx="minor">
-            <a:schemeClr val="lt1"/>
-          </a:fontRef>
-        </p:style>
-        <p:txBody>
-          <a:bodyPr rtlCol="0" anchor="ctr"/>
-          <a:lstStyle/>
-          <a:p>
-            <a:pPr algn="ctr"/>
-            <a:endParaRPr lang="en-US">
-              <a:solidFill>
-                <a:prstClr val="white"/>
-              </a:solidFill>
-            </a:endParaRPr>
-          </a:p>
-        </p:txBody>
-      </p:sp>
-      <p:sp>
-        <p:nvSpPr>
-          <p:cNvPr id="18" name="Down Arrow 17"/>
-          <p:cNvSpPr/>
-          <p:nvPr/>
-        </p:nvSpPr>
-        <p:spPr>
-          <a:xfrm rot="10800000">
-            <a:off x="2084805" y="1905000"/>
-            <a:ext cx="486640" cy="533400"/>
-          </a:xfrm>
-          <a:prstGeom prst="downArrow">
-            <a:avLst/>
-          </a:prstGeom>
-        </p:spPr>
-        <p:style>
-          <a:lnRef idx="2">
-            <a:schemeClr val="dk1">
-              <a:shade val="50000"/>
-            </a:schemeClr>
-          </a:lnRef>
-          <a:fillRef idx="1">
-            <a:schemeClr val="dk1"/>
-          </a:fillRef>
-          <a:effectRef idx="0">
-            <a:schemeClr val="dk1"/>
-          </a:effectRef>
-          <a:fontRef idx="minor">
-            <a:schemeClr val="lt1"/>
-          </a:fontRef>
-        </p:style>
-        <p:txBody>
-          <a:bodyPr rtlCol="0" anchor="ctr"/>
-          <a:lstStyle/>
-          <a:p>
-            <a:pPr algn="ctr"/>
-            <a:endParaRPr lang="en-US">
-              <a:solidFill>
-                <a:prstClr val="white"/>
-              </a:solidFill>
-            </a:endParaRPr>
-          </a:p>
-        </p:txBody>
-      </p:sp>
     </p:spTree>
     <p:extLst>
       <p:ext uri="{BB962C8B-B14F-4D97-AF65-F5344CB8AC3E}">
@@ -6943,7 +6511,7 @@
 </p:sld>
 </file>
 
-<file path=ppt/slides/slide3.xml><?xml version="1.0" encoding="utf-8"?>
+<file path=ppt/slides/slide2.xml><?xml version="1.0" encoding="utf-8"?>
 <p:sld xmlns:a="http://schemas.openxmlformats.org/drawingml/2006/main" xmlns:r="http://schemas.openxmlformats.org/officeDocument/2006/relationships" xmlns:p="http://schemas.openxmlformats.org/presentationml/2006/main">
   <p:cSld>
     <p:spTree>
@@ -8747,7 +8315,7 @@
 </p:sld>
 </file>
 
-<file path=ppt/slides/slide4.xml><?xml version="1.0" encoding="utf-8"?>
+<file path=ppt/slides/slide3.xml><?xml version="1.0" encoding="utf-8"?>
 <p:sld xmlns:a="http://schemas.openxmlformats.org/drawingml/2006/main" xmlns:r="http://schemas.openxmlformats.org/officeDocument/2006/relationships" xmlns:p="http://schemas.openxmlformats.org/presentationml/2006/main">
   <p:cSld>
     <p:spTree>

</xml_diff>

<commit_message>
Change "mouth" node to "airway" in circuit diagrams. Updated system fidelity figure.
</commit_message>
<xml_diff>
--- a/docs/Figures/AnesthesiaMachineWorking.pptx
+++ b/docs/Figures/AnesthesiaMachineWorking.pptx
@@ -211,7 +211,7 @@
           <a:p>
             <a:fld id="{7B126BB8-5932-4ACC-8CD5-328D9DA138C9}" type="datetimeFigureOut">
               <a:rPr lang="en-US" smtClean="0"/>
-              <a:t>1/7/2020</a:t>
+              <a:t>6/11/2020</a:t>
             </a:fld>
             <a:endParaRPr lang="en-US"/>
           </a:p>
@@ -478,6 +478,90 @@
 </p:notesMaster>
 </file>
 
+<file path=ppt/notesSlides/notesSlide1.xml><?xml version="1.0" encoding="utf-8"?>
+<p:notes xmlns:a="http://schemas.openxmlformats.org/drawingml/2006/main" xmlns:r="http://schemas.openxmlformats.org/officeDocument/2006/relationships" xmlns:p="http://schemas.openxmlformats.org/presentationml/2006/main">
+  <p:cSld>
+    <p:spTree>
+      <p:nvGrpSpPr>
+        <p:cNvPr id="1" name=""/>
+        <p:cNvGrpSpPr/>
+        <p:nvPr/>
+      </p:nvGrpSpPr>
+      <p:grpSpPr>
+        <a:xfrm>
+          <a:off x="0" y="0"/>
+          <a:ext cx="0" cy="0"/>
+          <a:chOff x="0" y="0"/>
+          <a:chExt cx="0" cy="0"/>
+        </a:xfrm>
+      </p:grpSpPr>
+      <p:sp>
+        <p:nvSpPr>
+          <p:cNvPr id="2" name="Slide Image Placeholder 1"/>
+          <p:cNvSpPr>
+            <a:spLocks noGrp="1" noRot="1" noChangeAspect="1"/>
+          </p:cNvSpPr>
+          <p:nvPr>
+            <p:ph type="sldImg"/>
+          </p:nvPr>
+        </p:nvSpPr>
+        <p:spPr/>
+      </p:sp>
+      <p:sp>
+        <p:nvSpPr>
+          <p:cNvPr id="3" name="Notes Placeholder 2"/>
+          <p:cNvSpPr>
+            <a:spLocks noGrp="1"/>
+          </p:cNvSpPr>
+          <p:nvPr>
+            <p:ph type="body" idx="1"/>
+          </p:nvPr>
+        </p:nvSpPr>
+        <p:spPr/>
+        <p:txBody>
+          <a:bodyPr/>
+          <a:lstStyle/>
+          <a:p>
+            <a:endParaRPr lang="en-US" dirty="0"/>
+          </a:p>
+        </p:txBody>
+      </p:sp>
+      <p:sp>
+        <p:nvSpPr>
+          <p:cNvPr id="4" name="Slide Number Placeholder 3"/>
+          <p:cNvSpPr>
+            <a:spLocks noGrp="1"/>
+          </p:cNvSpPr>
+          <p:nvPr>
+            <p:ph type="sldNum" sz="quarter" idx="5"/>
+          </p:nvPr>
+        </p:nvSpPr>
+        <p:spPr/>
+        <p:txBody>
+          <a:bodyPr/>
+          <a:lstStyle/>
+          <a:p>
+            <a:fld id="{3FEE9A71-B8D6-467E-9737-A44765197244}" type="slidenum">
+              <a:rPr lang="en-US" smtClean="0"/>
+              <a:t>3</a:t>
+            </a:fld>
+            <a:endParaRPr lang="en-US"/>
+          </a:p>
+        </p:txBody>
+      </p:sp>
+    </p:spTree>
+    <p:extLst>
+      <p:ext uri="{BB962C8B-B14F-4D97-AF65-F5344CB8AC3E}">
+        <p14:creationId xmlns:p14="http://schemas.microsoft.com/office/powerpoint/2010/main" val="2061417613"/>
+      </p:ext>
+    </p:extLst>
+  </p:cSld>
+  <p:clrMapOvr>
+    <a:masterClrMapping/>
+  </p:clrMapOvr>
+</p:notes>
+</file>
+
 <file path=ppt/slideLayouts/slideLayout1.xml><?xml version="1.0" encoding="utf-8"?>
 <p:sldLayout xmlns:a="http://schemas.openxmlformats.org/drawingml/2006/main" xmlns:r="http://schemas.openxmlformats.org/officeDocument/2006/relationships" xmlns:p="http://schemas.openxmlformats.org/presentationml/2006/main" type="title" preserve="1">
   <p:cSld name="Title Slide">
@@ -657,7 +741,7 @@
           <a:p>
             <a:fld id="{9E9AFD63-10BD-4598-9E1E-9FFECB76D2D7}" type="datetimeFigureOut">
               <a:rPr lang="en-US" smtClean="0"/>
-              <a:t>1/7/2020</a:t>
+              <a:t>6/11/2020</a:t>
             </a:fld>
             <a:endParaRPr lang="en-US"/>
           </a:p>
@@ -825,7 +909,7 @@
           <a:p>
             <a:fld id="{9E9AFD63-10BD-4598-9E1E-9FFECB76D2D7}" type="datetimeFigureOut">
               <a:rPr lang="en-US" smtClean="0"/>
-              <a:t>1/7/2020</a:t>
+              <a:t>6/11/2020</a:t>
             </a:fld>
             <a:endParaRPr lang="en-US"/>
           </a:p>
@@ -1003,7 +1087,7 @@
           <a:p>
             <a:fld id="{9E9AFD63-10BD-4598-9E1E-9FFECB76D2D7}" type="datetimeFigureOut">
               <a:rPr lang="en-US" smtClean="0"/>
-              <a:t>1/7/2020</a:t>
+              <a:t>6/11/2020</a:t>
             </a:fld>
             <a:endParaRPr lang="en-US"/>
           </a:p>
@@ -2758,7 +2842,7 @@
           <a:p>
             <a:fld id="{9E9AFD63-10BD-4598-9E1E-9FFECB76D2D7}" type="datetimeFigureOut">
               <a:rPr lang="en-US" smtClean="0"/>
-              <a:t>1/7/2020</a:t>
+              <a:t>6/11/2020</a:t>
             </a:fld>
             <a:endParaRPr lang="en-US"/>
           </a:p>
@@ -3202,7 +3286,7 @@
           <a:p>
             <a:fld id="{9E9AFD63-10BD-4598-9E1E-9FFECB76D2D7}" type="datetimeFigureOut">
               <a:rPr lang="en-US" smtClean="0"/>
-              <a:t>1/7/2020</a:t>
+              <a:t>6/11/2020</a:t>
             </a:fld>
             <a:endParaRPr lang="en-US"/>
           </a:p>
@@ -3487,7 +3571,7 @@
           <a:p>
             <a:fld id="{9E9AFD63-10BD-4598-9E1E-9FFECB76D2D7}" type="datetimeFigureOut">
               <a:rPr lang="en-US" smtClean="0"/>
-              <a:t>1/7/2020</a:t>
+              <a:t>6/11/2020</a:t>
             </a:fld>
             <a:endParaRPr lang="en-US"/>
           </a:p>
@@ -3906,7 +3990,7 @@
           <a:p>
             <a:fld id="{9E9AFD63-10BD-4598-9E1E-9FFECB76D2D7}" type="datetimeFigureOut">
               <a:rPr lang="en-US" smtClean="0"/>
-              <a:t>1/7/2020</a:t>
+              <a:t>6/11/2020</a:t>
             </a:fld>
             <a:endParaRPr lang="en-US"/>
           </a:p>
@@ -4023,7 +4107,7 @@
           <a:p>
             <a:fld id="{9E9AFD63-10BD-4598-9E1E-9FFECB76D2D7}" type="datetimeFigureOut">
               <a:rPr lang="en-US" smtClean="0"/>
-              <a:t>1/7/2020</a:t>
+              <a:t>6/11/2020</a:t>
             </a:fld>
             <a:endParaRPr lang="en-US"/>
           </a:p>
@@ -4118,7 +4202,7 @@
           <a:p>
             <a:fld id="{9E9AFD63-10BD-4598-9E1E-9FFECB76D2D7}" type="datetimeFigureOut">
               <a:rPr lang="en-US" smtClean="0"/>
-              <a:t>1/7/2020</a:t>
+              <a:t>6/11/2020</a:t>
             </a:fld>
             <a:endParaRPr lang="en-US"/>
           </a:p>
@@ -4393,7 +4477,7 @@
           <a:p>
             <a:fld id="{9E9AFD63-10BD-4598-9E1E-9FFECB76D2D7}" type="datetimeFigureOut">
               <a:rPr lang="en-US" smtClean="0"/>
-              <a:t>1/7/2020</a:t>
+              <a:t>6/11/2020</a:t>
             </a:fld>
             <a:endParaRPr lang="en-US"/>
           </a:p>
@@ -4645,7 +4729,7 @@
           <a:p>
             <a:fld id="{9E9AFD63-10BD-4598-9E1E-9FFECB76D2D7}" type="datetimeFigureOut">
               <a:rPr lang="en-US" smtClean="0"/>
-              <a:t>1/7/2020</a:t>
+              <a:t>6/11/2020</a:t>
             </a:fld>
             <a:endParaRPr lang="en-US"/>
           </a:p>
@@ -4856,7 +4940,7 @@
           <a:p>
             <a:fld id="{9E9AFD63-10BD-4598-9E1E-9FFECB76D2D7}" type="datetimeFigureOut">
               <a:rPr lang="en-US" smtClean="0"/>
-              <a:t>1/7/2020</a:t>
+              <a:t>6/11/2020</a:t>
             </a:fld>
             <a:endParaRPr lang="en-US"/>
           </a:p>
@@ -8334,10 +8418,10 @@
       </p:grpSpPr>
       <p:pic>
         <p:nvPicPr>
-          <p:cNvPr id="2" name="Picture 1">
+          <p:cNvPr id="3" name="Picture 2">
             <a:extLst>
               <a:ext uri="{FF2B5EF4-FFF2-40B4-BE49-F238E27FC236}">
-                <a16:creationId xmlns:a16="http://schemas.microsoft.com/office/drawing/2014/main" id="{3C510545-AC06-4315-A3ED-D1E329930A8B}"/>
+                <a16:creationId xmlns:a16="http://schemas.microsoft.com/office/drawing/2014/main" id="{4CE0DABE-9CB9-4983-ADD6-AA00AC4C4BEF}"/>
               </a:ext>
             </a:extLst>
           </p:cNvPr>
@@ -8347,15 +8431,15 @@
           <p:nvPr/>
         </p:nvPicPr>
         <p:blipFill>
-          <a:blip r:embed="rId2"/>
+          <a:blip r:embed="rId3"/>
           <a:stretch>
             <a:fillRect/>
           </a:stretch>
         </p:blipFill>
         <p:spPr>
           <a:xfrm>
-            <a:off x="0" y="22074"/>
-            <a:ext cx="9144000" cy="6813852"/>
+            <a:off x="0" y="51922"/>
+            <a:ext cx="9144000" cy="6754156"/>
           </a:xfrm>
           <a:prstGeom prst="rect">
             <a:avLst/>

</xml_diff>